<commit_message>
Presentation work in process
</commit_message>
<xml_diff>
--- a/Operating Systems/19205.pptx
+++ b/Operating Systems/19205.pptx
@@ -13,14 +13,17 @@
     <p:sldId id="265" r:id="rId7"/>
     <p:sldId id="259" r:id="rId8"/>
     <p:sldId id="268" r:id="rId9"/>
-    <p:sldId id="271" r:id="rId10"/>
-    <p:sldId id="260" r:id="rId11"/>
-    <p:sldId id="272" r:id="rId12"/>
-    <p:sldId id="261" r:id="rId13"/>
-    <p:sldId id="262" r:id="rId14"/>
-    <p:sldId id="263" r:id="rId15"/>
-    <p:sldId id="270" r:id="rId16"/>
-    <p:sldId id="267" r:id="rId17"/>
+    <p:sldId id="275" r:id="rId10"/>
+    <p:sldId id="271" r:id="rId11"/>
+    <p:sldId id="260" r:id="rId12"/>
+    <p:sldId id="272" r:id="rId13"/>
+    <p:sldId id="273" r:id="rId14"/>
+    <p:sldId id="274" r:id="rId15"/>
+    <p:sldId id="261" r:id="rId16"/>
+    <p:sldId id="262" r:id="rId17"/>
+    <p:sldId id="263" r:id="rId18"/>
+    <p:sldId id="270" r:id="rId19"/>
+    <p:sldId id="267" r:id="rId20"/>
   </p:sldIdLst>
   <p:sldSz cx="12192000" cy="6858000"/>
   <p:notesSz cx="6858000" cy="9144000"/>
@@ -258,7 +261,7 @@
           <a:p>
             <a:fld id="{9BBA2B65-287C-499E-BA6E-C03F186318F7}" type="datetimeFigureOut">
               <a:rPr lang="en-US" smtClean="0"/>
-              <a:t>6/7/2023</a:t>
+              <a:t>6/10/2023</a:t>
             </a:fld>
             <a:endParaRPr lang="en-US"/>
           </a:p>
@@ -428,7 +431,7 @@
           <a:p>
             <a:fld id="{9BBA2B65-287C-499E-BA6E-C03F186318F7}" type="datetimeFigureOut">
               <a:rPr lang="en-US" smtClean="0"/>
-              <a:t>6/7/2023</a:t>
+              <a:t>6/10/2023</a:t>
             </a:fld>
             <a:endParaRPr lang="en-US"/>
           </a:p>
@@ -608,7 +611,7 @@
           <a:p>
             <a:fld id="{9BBA2B65-287C-499E-BA6E-C03F186318F7}" type="datetimeFigureOut">
               <a:rPr lang="en-US" smtClean="0"/>
-              <a:t>6/7/2023</a:t>
+              <a:t>6/10/2023</a:t>
             </a:fld>
             <a:endParaRPr lang="en-US"/>
           </a:p>
@@ -778,7 +781,7 @@
           <a:p>
             <a:fld id="{9BBA2B65-287C-499E-BA6E-C03F186318F7}" type="datetimeFigureOut">
               <a:rPr lang="en-US" smtClean="0"/>
-              <a:t>6/7/2023</a:t>
+              <a:t>6/10/2023</a:t>
             </a:fld>
             <a:endParaRPr lang="en-US"/>
           </a:p>
@@ -1024,7 +1027,7 @@
           <a:p>
             <a:fld id="{9BBA2B65-287C-499E-BA6E-C03F186318F7}" type="datetimeFigureOut">
               <a:rPr lang="en-US" smtClean="0"/>
-              <a:t>6/7/2023</a:t>
+              <a:t>6/10/2023</a:t>
             </a:fld>
             <a:endParaRPr lang="en-US"/>
           </a:p>
@@ -1256,7 +1259,7 @@
           <a:p>
             <a:fld id="{9BBA2B65-287C-499E-BA6E-C03F186318F7}" type="datetimeFigureOut">
               <a:rPr lang="en-US" smtClean="0"/>
-              <a:t>6/7/2023</a:t>
+              <a:t>6/10/2023</a:t>
             </a:fld>
             <a:endParaRPr lang="en-US"/>
           </a:p>
@@ -1623,7 +1626,7 @@
           <a:p>
             <a:fld id="{9BBA2B65-287C-499E-BA6E-C03F186318F7}" type="datetimeFigureOut">
               <a:rPr lang="en-US" smtClean="0"/>
-              <a:t>6/7/2023</a:t>
+              <a:t>6/10/2023</a:t>
             </a:fld>
             <a:endParaRPr lang="en-US"/>
           </a:p>
@@ -1741,7 +1744,7 @@
           <a:p>
             <a:fld id="{9BBA2B65-287C-499E-BA6E-C03F186318F7}" type="datetimeFigureOut">
               <a:rPr lang="en-US" smtClean="0"/>
-              <a:t>6/7/2023</a:t>
+              <a:t>6/10/2023</a:t>
             </a:fld>
             <a:endParaRPr lang="en-US"/>
           </a:p>
@@ -1836,7 +1839,7 @@
           <a:p>
             <a:fld id="{9BBA2B65-287C-499E-BA6E-C03F186318F7}" type="datetimeFigureOut">
               <a:rPr lang="en-US" smtClean="0"/>
-              <a:t>6/7/2023</a:t>
+              <a:t>6/10/2023</a:t>
             </a:fld>
             <a:endParaRPr lang="en-US"/>
           </a:p>
@@ -2113,7 +2116,7 @@
           <a:p>
             <a:fld id="{9BBA2B65-287C-499E-BA6E-C03F186318F7}" type="datetimeFigureOut">
               <a:rPr lang="en-US" smtClean="0"/>
-              <a:t>6/7/2023</a:t>
+              <a:t>6/10/2023</a:t>
             </a:fld>
             <a:endParaRPr lang="en-US"/>
           </a:p>
@@ -2370,7 +2373,7 @@
           <a:p>
             <a:fld id="{9BBA2B65-287C-499E-BA6E-C03F186318F7}" type="datetimeFigureOut">
               <a:rPr lang="en-US" smtClean="0"/>
-              <a:t>6/7/2023</a:t>
+              <a:t>6/10/2023</a:t>
             </a:fld>
             <a:endParaRPr lang="en-US"/>
           </a:p>
@@ -2583,7 +2586,7 @@
           <a:p>
             <a:fld id="{9BBA2B65-287C-499E-BA6E-C03F186318F7}" type="datetimeFigureOut">
               <a:rPr lang="en-US" smtClean="0"/>
-              <a:t>6/7/2023</a:t>
+              <a:t>6/10/2023</a:t>
             </a:fld>
             <a:endParaRPr lang="en-US"/>
           </a:p>
@@ -3137,6 +3140,641 @@
         </p:nvSpPr>
         <p:spPr>
           <a:xfrm>
+            <a:off x="946951" y="337351"/>
+            <a:ext cx="10298097" cy="1384917"/>
+          </a:xfrm>
+        </p:spPr>
+        <p:txBody>
+          <a:bodyPr>
+            <a:normAutofit fontScale="90000"/>
+          </a:bodyPr>
+          <a:lstStyle/>
+          <a:p>
+            <a:pPr algn="ctr"/>
+            <a:r>
+              <a:rPr lang="bg-BG" b="0" i="0" u="none" strike="noStrike" dirty="0">
+                <a:solidFill>
+                  <a:srgbClr val="000000"/>
+                </a:solidFill>
+                <a:effectLst/>
+                <a:latin typeface="Times New Roman" panose="02020603050405020304" pitchFamily="18" charset="0"/>
+                <a:cs typeface="Times New Roman" panose="02020603050405020304" pitchFamily="18" charset="0"/>
+              </a:rPr>
+              <a:t>Променливи, условни оператори, цикли, масиви, функции</a:t>
+            </a:r>
+            <a:r>
+              <a:rPr lang="en-US" b="0" i="0" u="none" strike="noStrike" dirty="0">
+                <a:solidFill>
+                  <a:srgbClr val="000000"/>
+                </a:solidFill>
+                <a:effectLst/>
+                <a:latin typeface="Times New Roman" panose="02020603050405020304" pitchFamily="18" charset="0"/>
+                <a:cs typeface="Times New Roman" panose="02020603050405020304" pitchFamily="18" charset="0"/>
+              </a:rPr>
+              <a:t>:</a:t>
+            </a:r>
+            <a:br>
+              <a:rPr lang="en-US" sz="4400" b="0" i="0" u="none" strike="noStrike" dirty="0">
+                <a:solidFill>
+                  <a:srgbClr val="000000"/>
+                </a:solidFill>
+                <a:effectLst/>
+                <a:latin typeface="Times New Roman" panose="02020603050405020304" pitchFamily="18" charset="0"/>
+                <a:cs typeface="Times New Roman" panose="02020603050405020304" pitchFamily="18" charset="0"/>
+              </a:rPr>
+            </a:br>
+            <a:r>
+              <a:rPr lang="bg-BG" sz="4000" b="0" i="0" u="none" strike="noStrike" dirty="0">
+                <a:solidFill>
+                  <a:srgbClr val="000000"/>
+                </a:solidFill>
+                <a:effectLst/>
+                <a:latin typeface="Times New Roman" panose="02020603050405020304" pitchFamily="18" charset="0"/>
+                <a:cs typeface="Times New Roman" panose="02020603050405020304" pitchFamily="18" charset="0"/>
+              </a:rPr>
+              <a:t>Условни оператори</a:t>
+            </a:r>
+            <a:endParaRPr lang="en-US" sz="4000" dirty="0">
+              <a:latin typeface="Times New Roman" panose="02020603050405020304" pitchFamily="18" charset="0"/>
+              <a:cs typeface="Times New Roman" panose="02020603050405020304" pitchFamily="18" charset="0"/>
+            </a:endParaRPr>
+          </a:p>
+        </p:txBody>
+      </p:sp>
+      <p:sp>
+        <p:nvSpPr>
+          <p:cNvPr id="3" name="Контейнер за съдържание 2">
+            <a:extLst>
+              <a:ext uri="{FF2B5EF4-FFF2-40B4-BE49-F238E27FC236}">
+                <a16:creationId xmlns:a16="http://schemas.microsoft.com/office/drawing/2014/main" id="{1CDDA73A-43AD-5F72-946A-013AC5543BBE}"/>
+              </a:ext>
+            </a:extLst>
+          </p:cNvPr>
+          <p:cNvSpPr>
+            <a:spLocks noGrp="1"/>
+          </p:cNvSpPr>
+          <p:nvPr>
+            <p:ph idx="1"/>
+          </p:nvPr>
+        </p:nvSpPr>
+        <p:spPr>
+          <a:xfrm>
+            <a:off x="470515" y="1868242"/>
+            <a:ext cx="9001957" cy="4459642"/>
+          </a:xfrm>
+        </p:spPr>
+        <p:txBody>
+          <a:bodyPr>
+            <a:normAutofit/>
+          </a:bodyPr>
+          <a:lstStyle/>
+          <a:p>
+            <a:pPr marL="514350" indent="-514350">
+              <a:buFont typeface="+mj-lt"/>
+              <a:buAutoNum type="arabicPeriod"/>
+            </a:pPr>
+            <a:r>
+              <a:rPr lang="bg-BG" sz="2200" dirty="0">
+                <a:latin typeface="Arial" panose="020B0604020202020204" pitchFamily="34" charset="0"/>
+                <a:cs typeface="Arial" panose="020B0604020202020204" pitchFamily="34" charset="0"/>
+              </a:rPr>
+              <a:t>Условие (</a:t>
+            </a:r>
+            <a:r>
+              <a:rPr lang="en-US" sz="2200" dirty="0">
+                <a:latin typeface="Arial" panose="020B0604020202020204" pitchFamily="34" charset="0"/>
+                <a:cs typeface="Arial" panose="020B0604020202020204" pitchFamily="34" charset="0"/>
+              </a:rPr>
+              <a:t>If – else if – else</a:t>
+            </a:r>
+            <a:r>
+              <a:rPr lang="bg-BG" sz="2200" dirty="0">
+                <a:latin typeface="Arial" panose="020B0604020202020204" pitchFamily="34" charset="0"/>
+                <a:cs typeface="Arial" panose="020B0604020202020204" pitchFamily="34" charset="0"/>
+              </a:rPr>
+              <a:t>)</a:t>
+            </a:r>
+            <a:endParaRPr lang="en-US" sz="2200" dirty="0">
+              <a:latin typeface="Arial" panose="020B0604020202020204" pitchFamily="34" charset="0"/>
+              <a:cs typeface="Arial" panose="020B0604020202020204" pitchFamily="34" charset="0"/>
+            </a:endParaRPr>
+          </a:p>
+          <a:p>
+            <a:pPr lvl="1"/>
+            <a:r>
+              <a:rPr lang="bg-BG" sz="1800" dirty="0">
+                <a:latin typeface="Arial" panose="020B0604020202020204" pitchFamily="34" charset="0"/>
+                <a:cs typeface="Arial" panose="020B0604020202020204" pitchFamily="34" charset="0"/>
+              </a:rPr>
+              <a:t>Често срещан случай в програмирането;</a:t>
+            </a:r>
+          </a:p>
+          <a:p>
+            <a:pPr lvl="1"/>
+            <a:r>
+              <a:rPr lang="bg-BG" sz="1800" dirty="0">
+                <a:latin typeface="Arial" panose="020B0604020202020204" pitchFamily="34" charset="0"/>
+                <a:cs typeface="Arial" panose="020B0604020202020204" pitchFamily="34" charset="0"/>
+              </a:rPr>
+              <a:t>Използва се когато искаме да </a:t>
+            </a:r>
+            <a:r>
+              <a:rPr lang="bg-BG" sz="1800" u="sng" dirty="0">
+                <a:latin typeface="Arial" panose="020B0604020202020204" pitchFamily="34" charset="0"/>
+                <a:cs typeface="Arial" panose="020B0604020202020204" pitchFamily="34" charset="0"/>
+              </a:rPr>
+              <a:t>оценим</a:t>
+            </a:r>
+            <a:r>
+              <a:rPr lang="bg-BG" sz="1800" dirty="0">
+                <a:latin typeface="Arial" panose="020B0604020202020204" pitchFamily="34" charset="0"/>
+                <a:cs typeface="Arial" panose="020B0604020202020204" pitchFamily="34" charset="0"/>
+              </a:rPr>
+              <a:t> дадено условие и на база </a:t>
+            </a:r>
+            <a:r>
+              <a:rPr lang="bg-BG" sz="1800" u="sng" dirty="0">
+                <a:latin typeface="Arial" panose="020B0604020202020204" pitchFamily="34" charset="0"/>
+                <a:cs typeface="Arial" panose="020B0604020202020204" pitchFamily="34" charset="0"/>
+              </a:rPr>
+              <a:t>резултата</a:t>
+            </a:r>
+            <a:r>
+              <a:rPr lang="bg-BG" sz="1800" dirty="0">
+                <a:latin typeface="Arial" panose="020B0604020202020204" pitchFamily="34" charset="0"/>
+                <a:cs typeface="Arial" panose="020B0604020202020204" pitchFamily="34" charset="0"/>
+              </a:rPr>
+              <a:t> да изпълним един набор от между 2 или повече набора оператори;</a:t>
+            </a:r>
+            <a:endParaRPr lang="en-US" sz="1800" dirty="0">
+              <a:latin typeface="Arial" panose="020B0604020202020204" pitchFamily="34" charset="0"/>
+              <a:cs typeface="Arial" panose="020B0604020202020204" pitchFamily="34" charset="0"/>
+            </a:endParaRPr>
+          </a:p>
+          <a:p>
+            <a:pPr lvl="1"/>
+            <a:r>
+              <a:rPr lang="bg-BG" sz="1800" dirty="0">
+                <a:latin typeface="Arial" panose="020B0604020202020204" pitchFamily="34" charset="0"/>
+                <a:cs typeface="Arial" panose="020B0604020202020204" pitchFamily="34" charset="0"/>
+              </a:rPr>
+              <a:t>За да работи проверката, условието трябва да е </a:t>
+            </a:r>
+            <a:r>
+              <a:rPr lang="bg-BG" sz="1800" u="sng" dirty="0">
+                <a:latin typeface="Arial" panose="020B0604020202020204" pitchFamily="34" charset="0"/>
+                <a:cs typeface="Arial" panose="020B0604020202020204" pitchFamily="34" charset="0"/>
+              </a:rPr>
+              <a:t>отделено</a:t>
+            </a:r>
+            <a:r>
+              <a:rPr lang="bg-BG" sz="1800" dirty="0">
+                <a:latin typeface="Arial" panose="020B0604020202020204" pitchFamily="34" charset="0"/>
+                <a:cs typeface="Arial" panose="020B0604020202020204" pitchFamily="34" charset="0"/>
+              </a:rPr>
+              <a:t> с </a:t>
+            </a:r>
+            <a:r>
+              <a:rPr lang="bg-BG" sz="1800" u="sng" dirty="0">
+                <a:latin typeface="Arial" panose="020B0604020202020204" pitchFamily="34" charset="0"/>
+                <a:cs typeface="Arial" panose="020B0604020202020204" pitchFamily="34" charset="0"/>
+              </a:rPr>
+              <a:t>интервали</a:t>
+            </a:r>
+            <a:r>
+              <a:rPr lang="bg-BG" sz="1800" dirty="0">
+                <a:latin typeface="Arial" panose="020B0604020202020204" pitchFamily="34" charset="0"/>
+                <a:cs typeface="Arial" panose="020B0604020202020204" pitchFamily="34" charset="0"/>
+              </a:rPr>
+              <a:t> вътре в </a:t>
+            </a:r>
+            <a:r>
+              <a:rPr lang="bg-BG" sz="1800" u="sng" dirty="0">
+                <a:latin typeface="Arial" panose="020B0604020202020204" pitchFamily="34" charset="0"/>
+                <a:cs typeface="Arial" panose="020B0604020202020204" pitchFamily="34" charset="0"/>
+              </a:rPr>
+              <a:t>скобите</a:t>
+            </a:r>
+            <a:r>
+              <a:rPr lang="bg-BG" sz="1800" dirty="0">
+                <a:latin typeface="Arial" panose="020B0604020202020204" pitchFamily="34" charset="0"/>
+                <a:cs typeface="Arial" panose="020B0604020202020204" pitchFamily="34" charset="0"/>
+              </a:rPr>
+              <a:t>, които са </a:t>
+            </a:r>
+            <a:r>
+              <a:rPr lang="bg-BG" sz="1800" u="sng" dirty="0">
+                <a:latin typeface="Arial" panose="020B0604020202020204" pitchFamily="34" charset="0"/>
+                <a:cs typeface="Arial" panose="020B0604020202020204" pitchFamily="34" charset="0"/>
+              </a:rPr>
+              <a:t>квадратни</a:t>
+            </a:r>
+            <a:r>
+              <a:rPr lang="bg-BG" sz="1800" dirty="0">
+                <a:latin typeface="Arial" panose="020B0604020202020204" pitchFamily="34" charset="0"/>
+                <a:cs typeface="Arial" panose="020B0604020202020204" pitchFamily="34" charset="0"/>
+              </a:rPr>
+              <a:t> </a:t>
+            </a:r>
+            <a:r>
+              <a:rPr lang="en-US" sz="1800" b="1" dirty="0">
+                <a:latin typeface="poppins" panose="00000500000000000000" pitchFamily="2" charset="0"/>
+                <a:cs typeface="poppins" panose="00000500000000000000" pitchFamily="2" charset="0"/>
+              </a:rPr>
+              <a:t>[</a:t>
+            </a:r>
+            <a:r>
+              <a:rPr lang="bg-BG" sz="1800" b="1" dirty="0">
+                <a:latin typeface="Arial" panose="020B0604020202020204" pitchFamily="34" charset="0"/>
+                <a:cs typeface="poppins" panose="00000500000000000000" pitchFamily="2" charset="0"/>
+              </a:rPr>
+              <a:t> </a:t>
+            </a:r>
+            <a:r>
+              <a:rPr lang="en-US" sz="1800" b="1" dirty="0">
+                <a:latin typeface="poppins" panose="00000500000000000000" pitchFamily="2" charset="0"/>
+                <a:cs typeface="poppins" panose="00000500000000000000" pitchFamily="2" charset="0"/>
+              </a:rPr>
+              <a:t>]</a:t>
+            </a:r>
+            <a:r>
+              <a:rPr lang="bg-BG" sz="1800" b="1" dirty="0">
+                <a:latin typeface="Arial" panose="020B0604020202020204" pitchFamily="34" charset="0"/>
+                <a:cs typeface="poppins" panose="00000500000000000000" pitchFamily="2" charset="0"/>
+              </a:rPr>
+              <a:t> </a:t>
+            </a:r>
+            <a:r>
+              <a:rPr lang="bg-BG" sz="1800" dirty="0">
+                <a:latin typeface="Arial" panose="020B0604020202020204" pitchFamily="34" charset="0"/>
+                <a:cs typeface="Arial" panose="020B0604020202020204" pitchFamily="34" charset="0"/>
+              </a:rPr>
+              <a:t>, а ключовата дума </a:t>
+            </a:r>
+            <a:r>
+              <a:rPr lang="en-US" sz="1800" dirty="0">
+                <a:latin typeface="Arial" panose="020B0604020202020204" pitchFamily="34" charset="0"/>
+                <a:cs typeface="Arial" panose="020B0604020202020204" pitchFamily="34" charset="0"/>
+              </a:rPr>
+              <a:t>if </a:t>
+            </a:r>
+            <a:r>
+              <a:rPr lang="bg-BG" sz="1800" dirty="0">
+                <a:latin typeface="Arial" panose="020B0604020202020204" pitchFamily="34" charset="0"/>
+                <a:cs typeface="Arial" panose="020B0604020202020204" pitchFamily="34" charset="0"/>
+              </a:rPr>
+              <a:t>също е </a:t>
+            </a:r>
+            <a:r>
+              <a:rPr lang="bg-BG" sz="1800" u="sng" dirty="0">
+                <a:latin typeface="Arial" panose="020B0604020202020204" pitchFamily="34" charset="0"/>
+                <a:cs typeface="Arial" panose="020B0604020202020204" pitchFamily="34" charset="0"/>
+              </a:rPr>
+              <a:t>отделена</a:t>
+            </a:r>
+            <a:r>
+              <a:rPr lang="bg-BG" sz="1800" dirty="0">
+                <a:latin typeface="Arial" panose="020B0604020202020204" pitchFamily="34" charset="0"/>
+                <a:cs typeface="Arial" panose="020B0604020202020204" pitchFamily="34" charset="0"/>
+              </a:rPr>
+              <a:t> с интервал от тях (фиг. 1);</a:t>
+            </a:r>
+          </a:p>
+        </p:txBody>
+      </p:sp>
+      <p:pic>
+        <p:nvPicPr>
+          <p:cNvPr id="12" name="Картина 11">
+            <a:extLst>
+              <a:ext uri="{FF2B5EF4-FFF2-40B4-BE49-F238E27FC236}">
+                <a16:creationId xmlns:a16="http://schemas.microsoft.com/office/drawing/2014/main" id="{75E97404-80B6-8DB4-C2D0-9611EE9C5754}"/>
+              </a:ext>
+            </a:extLst>
+          </p:cNvPr>
+          <p:cNvPicPr>
+            <a:picLocks noChangeAspect="1"/>
+          </p:cNvPicPr>
+          <p:nvPr/>
+        </p:nvPicPr>
+        <p:blipFill>
+          <a:blip r:embed="rId2">
+            <a:extLst>
+              <a:ext uri="{28A0092B-C50C-407E-A947-70E740481C1C}">
+                <a14:useLocalDpi xmlns:a14="http://schemas.microsoft.com/office/drawing/2010/main" val="0"/>
+              </a:ext>
+            </a:extLst>
+          </a:blip>
+          <a:stretch>
+            <a:fillRect/>
+          </a:stretch>
+        </p:blipFill>
+        <p:spPr>
+          <a:xfrm>
+            <a:off x="9397102" y="1331651"/>
+            <a:ext cx="2364241" cy="1869028"/>
+          </a:xfrm>
+          <a:prstGeom prst="rect">
+            <a:avLst/>
+          </a:prstGeom>
+          <a:ln>
+            <a:noFill/>
+          </a:ln>
+          <a:effectLst>
+            <a:reflection blurRad="12700" stA="30000" endPos="30000" dist="5000" dir="5400000" sy="-100000" algn="bl" rotWithShape="0"/>
+          </a:effectLst>
+          <a:scene3d>
+            <a:camera prst="perspectiveContrastingLeftFacing">
+              <a:rot lat="300000" lon="19800000" rev="0"/>
+            </a:camera>
+            <a:lightRig rig="threePt" dir="t">
+              <a:rot lat="0" lon="0" rev="2700000"/>
+            </a:lightRig>
+          </a:scene3d>
+          <a:sp3d>
+            <a:bevelT w="63500" h="50800"/>
+          </a:sp3d>
+        </p:spPr>
+      </p:pic>
+      <p:pic>
+        <p:nvPicPr>
+          <p:cNvPr id="14" name="Картина 13">
+            <a:extLst>
+              <a:ext uri="{FF2B5EF4-FFF2-40B4-BE49-F238E27FC236}">
+                <a16:creationId xmlns:a16="http://schemas.microsoft.com/office/drawing/2014/main" id="{16B80901-4F77-82DC-DD53-6FCA8831973F}"/>
+              </a:ext>
+            </a:extLst>
+          </p:cNvPr>
+          <p:cNvPicPr>
+            <a:picLocks noChangeAspect="1"/>
+          </p:cNvPicPr>
+          <p:nvPr/>
+        </p:nvPicPr>
+        <p:blipFill rotWithShape="1">
+          <a:blip r:embed="rId3">
+            <a:extLst>
+              <a:ext uri="{28A0092B-C50C-407E-A947-70E740481C1C}">
+                <a14:useLocalDpi xmlns:a14="http://schemas.microsoft.com/office/drawing/2010/main" val="0"/>
+              </a:ext>
+            </a:extLst>
+          </a:blip>
+          <a:srcRect l="9033" t="7720" r="5000" b="3457"/>
+          <a:stretch/>
+        </p:blipFill>
+        <p:spPr>
+          <a:xfrm>
+            <a:off x="6291537" y="3937758"/>
+            <a:ext cx="5394436" cy="2565646"/>
+          </a:xfrm>
+          <a:prstGeom prst="rect">
+            <a:avLst/>
+          </a:prstGeom>
+          <a:ln w="38100" cap="sq">
+            <a:solidFill>
+              <a:srgbClr val="000000"/>
+            </a:solidFill>
+            <a:prstDash val="solid"/>
+            <a:miter lim="800000"/>
+          </a:ln>
+          <a:effectLst>
+            <a:outerShdw blurRad="50800" dist="38100" dir="2700000" algn="tl" rotWithShape="0">
+              <a:srgbClr val="000000">
+                <a:alpha val="43000"/>
+              </a:srgbClr>
+            </a:outerShdw>
+          </a:effectLst>
+        </p:spPr>
+      </p:pic>
+      <p:sp>
+        <p:nvSpPr>
+          <p:cNvPr id="16" name="Текстово поле 15">
+            <a:extLst>
+              <a:ext uri="{FF2B5EF4-FFF2-40B4-BE49-F238E27FC236}">
+                <a16:creationId xmlns:a16="http://schemas.microsoft.com/office/drawing/2014/main" id="{FED3054F-0676-B4DB-AFD8-E92BAAEDFF22}"/>
+              </a:ext>
+            </a:extLst>
+          </p:cNvPr>
+          <p:cNvSpPr txBox="1"/>
+          <p:nvPr/>
+        </p:nvSpPr>
+        <p:spPr>
+          <a:xfrm>
+            <a:off x="911439" y="3906178"/>
+            <a:ext cx="5149049" cy="1200329"/>
+          </a:xfrm>
+          <a:prstGeom prst="rect">
+            <a:avLst/>
+          </a:prstGeom>
+          <a:noFill/>
+        </p:spPr>
+        <p:txBody>
+          <a:bodyPr wrap="square" rtlCol="0">
+            <a:spAutoFit/>
+          </a:bodyPr>
+          <a:lstStyle/>
+          <a:p>
+            <a:pPr marL="285750" indent="-285750">
+              <a:buFont typeface="Arial" panose="020B0604020202020204" pitchFamily="34" charset="0"/>
+              <a:buChar char="•"/>
+            </a:pPr>
+            <a:r>
+              <a:rPr lang="bg-BG" dirty="0">
+                <a:latin typeface="Arial" panose="020B0604020202020204" pitchFamily="34" charset="0"/>
+                <a:cs typeface="Arial" panose="020B0604020202020204" pitchFamily="34" charset="0"/>
+              </a:rPr>
+              <a:t>При </a:t>
+            </a:r>
+            <a:r>
+              <a:rPr lang="en-US" dirty="0">
+                <a:latin typeface="Arial" panose="020B0604020202020204" pitchFamily="34" charset="0"/>
+                <a:cs typeface="Arial" panose="020B0604020202020204" pitchFamily="34" charset="0"/>
+              </a:rPr>
+              <a:t>BASH</a:t>
+            </a:r>
+            <a:r>
+              <a:rPr lang="bg-BG" dirty="0">
+                <a:latin typeface="Arial" panose="020B0604020202020204" pitchFamily="34" charset="0"/>
+                <a:cs typeface="Arial" panose="020B0604020202020204" pitchFamily="34" charset="0"/>
+              </a:rPr>
+              <a:t> програмирането се използват и ключовите думи </a:t>
+            </a:r>
+            <a:r>
+              <a:rPr lang="en-US" b="1" dirty="0">
+                <a:latin typeface="poppins" panose="00000500000000000000" pitchFamily="2" charset="0"/>
+                <a:cs typeface="poppins" panose="00000500000000000000" pitchFamily="2" charset="0"/>
+              </a:rPr>
+              <a:t>then</a:t>
+            </a:r>
+            <a:r>
+              <a:rPr lang="bg-BG" dirty="0">
+                <a:latin typeface="Arial" panose="020B0604020202020204" pitchFamily="34" charset="0"/>
+                <a:cs typeface="Arial" panose="020B0604020202020204" pitchFamily="34" charset="0"/>
+              </a:rPr>
+              <a:t> и</a:t>
+            </a:r>
+            <a:r>
+              <a:rPr lang="en-US" dirty="0">
+                <a:latin typeface="Arial" panose="020B0604020202020204" pitchFamily="34" charset="0"/>
+                <a:cs typeface="Arial" panose="020B0604020202020204" pitchFamily="34" charset="0"/>
+              </a:rPr>
+              <a:t> </a:t>
+            </a:r>
+            <a:r>
+              <a:rPr lang="en-US" b="1" dirty="0">
+                <a:latin typeface="poppins" panose="00000500000000000000" pitchFamily="2" charset="0"/>
+                <a:cs typeface="poppins" panose="00000500000000000000" pitchFamily="2" charset="0"/>
+              </a:rPr>
+              <a:t>fi</a:t>
+            </a:r>
+            <a:r>
+              <a:rPr lang="bg-BG" b="1" dirty="0">
+                <a:latin typeface="poppins" panose="00000500000000000000" pitchFamily="2" charset="0"/>
+                <a:cs typeface="poppins" panose="00000500000000000000" pitchFamily="2" charset="0"/>
+              </a:rPr>
+              <a:t> </a:t>
+            </a:r>
+            <a:endParaRPr lang="en-US" b="1" dirty="0">
+              <a:latin typeface="poppins" panose="00000500000000000000" pitchFamily="2" charset="0"/>
+              <a:cs typeface="poppins" panose="00000500000000000000" pitchFamily="2" charset="0"/>
+            </a:endParaRPr>
+          </a:p>
+          <a:p>
+            <a:pPr marL="285750" indent="-285750">
+              <a:buFont typeface="Arial" panose="020B0604020202020204" pitchFamily="34" charset="0"/>
+              <a:buChar char="•"/>
+            </a:pPr>
+            <a:r>
+              <a:rPr lang="bg-BG" dirty="0">
+                <a:latin typeface="Arial" panose="020B0604020202020204" pitchFamily="34" charset="0"/>
+                <a:cs typeface="Arial" panose="020B0604020202020204" pitchFamily="34" charset="0"/>
+              </a:rPr>
+              <a:t>При </a:t>
+            </a:r>
+            <a:r>
+              <a:rPr lang="en-US" dirty="0">
+                <a:latin typeface="Arial" panose="020B0604020202020204" pitchFamily="34" charset="0"/>
+                <a:cs typeface="Arial" panose="020B0604020202020204" pitchFamily="34" charset="0"/>
+              </a:rPr>
+              <a:t>BASH</a:t>
+            </a:r>
+            <a:r>
+              <a:rPr lang="bg-BG" dirty="0">
+                <a:latin typeface="Arial" panose="020B0604020202020204" pitchFamily="34" charset="0"/>
+                <a:cs typeface="Arial" panose="020B0604020202020204" pitchFamily="34" charset="0"/>
+              </a:rPr>
+              <a:t> програмирането </a:t>
+            </a:r>
+            <a:r>
+              <a:rPr lang="en-US" dirty="0">
+                <a:latin typeface="Arial" panose="020B0604020202020204" pitchFamily="34" charset="0"/>
+                <a:cs typeface="Arial" panose="020B0604020202020204" pitchFamily="34" charset="0"/>
+              </a:rPr>
+              <a:t>else if </a:t>
+            </a:r>
+            <a:r>
+              <a:rPr lang="bg-BG" dirty="0">
+                <a:latin typeface="Arial" panose="020B0604020202020204" pitchFamily="34" charset="0"/>
+                <a:cs typeface="Arial" panose="020B0604020202020204" pitchFamily="34" charset="0"/>
+              </a:rPr>
+              <a:t>се записва с </a:t>
+            </a:r>
+            <a:r>
+              <a:rPr lang="en-US" b="1" dirty="0" err="1">
+                <a:latin typeface="poppins" panose="00000500000000000000" pitchFamily="2" charset="0"/>
+                <a:cs typeface="poppins" panose="00000500000000000000" pitchFamily="2" charset="0"/>
+              </a:rPr>
+              <a:t>elif</a:t>
+            </a:r>
+            <a:endParaRPr lang="en-US" b="1" dirty="0">
+              <a:latin typeface="poppins" panose="00000500000000000000" pitchFamily="2" charset="0"/>
+              <a:cs typeface="poppins" panose="00000500000000000000" pitchFamily="2" charset="0"/>
+            </a:endParaRPr>
+          </a:p>
+        </p:txBody>
+      </p:sp>
+      <p:sp>
+        <p:nvSpPr>
+          <p:cNvPr id="20" name="Текстово поле 19">
+            <a:extLst>
+              <a:ext uri="{FF2B5EF4-FFF2-40B4-BE49-F238E27FC236}">
+                <a16:creationId xmlns:a16="http://schemas.microsoft.com/office/drawing/2014/main" id="{BD54FCC0-0A53-81F2-DC98-412BEEF09A7C}"/>
+              </a:ext>
+            </a:extLst>
+          </p:cNvPr>
+          <p:cNvSpPr txBox="1"/>
+          <p:nvPr/>
+        </p:nvSpPr>
+        <p:spPr>
+          <a:xfrm>
+            <a:off x="5328673" y="6151317"/>
+            <a:ext cx="767326" cy="369332"/>
+          </a:xfrm>
+          <a:prstGeom prst="rect">
+            <a:avLst/>
+          </a:prstGeom>
+          <a:noFill/>
+        </p:spPr>
+        <p:txBody>
+          <a:bodyPr wrap="none" rtlCol="0">
+            <a:spAutoFit/>
+          </a:bodyPr>
+          <a:lstStyle/>
+          <a:p>
+            <a:r>
+              <a:rPr lang="bg-BG" dirty="0"/>
+              <a:t>Фиг. 1</a:t>
+            </a:r>
+            <a:endParaRPr lang="en-US" dirty="0"/>
+          </a:p>
+        </p:txBody>
+      </p:sp>
+    </p:spTree>
+    <p:extLst>
+      <p:ext uri="{BB962C8B-B14F-4D97-AF65-F5344CB8AC3E}">
+        <p14:creationId xmlns:p14="http://schemas.microsoft.com/office/powerpoint/2010/main" val="326698737"/>
+      </p:ext>
+    </p:extLst>
+  </p:cSld>
+  <p:clrMapOvr>
+    <a:masterClrMapping/>
+  </p:clrMapOvr>
+</p:sld>
+</file>
+
+<file path=ppt/slides/slide11.xml><?xml version="1.0" encoding="utf-8"?>
+<p:sld xmlns:a="http://schemas.openxmlformats.org/drawingml/2006/main" xmlns:r="http://schemas.openxmlformats.org/officeDocument/2006/relationships" xmlns:p="http://schemas.openxmlformats.org/presentationml/2006/main">
+  <p:cSld>
+    <p:spTree>
+      <p:nvGrpSpPr>
+        <p:cNvPr id="1" name=""/>
+        <p:cNvGrpSpPr/>
+        <p:nvPr/>
+      </p:nvGrpSpPr>
+      <p:grpSpPr>
+        <a:xfrm>
+          <a:off x="0" y="0"/>
+          <a:ext cx="0" cy="0"/>
+          <a:chOff x="0" y="0"/>
+          <a:chExt cx="0" cy="0"/>
+        </a:xfrm>
+      </p:grpSpPr>
+      <p:sp>
+        <p:nvSpPr>
+          <p:cNvPr id="2" name="Заглавие 1">
+            <a:extLst>
+              <a:ext uri="{FF2B5EF4-FFF2-40B4-BE49-F238E27FC236}">
+                <a16:creationId xmlns:a16="http://schemas.microsoft.com/office/drawing/2014/main" id="{F78A924E-54DB-CA0D-5619-D5CAA2584F91}"/>
+              </a:ext>
+            </a:extLst>
+          </p:cNvPr>
+          <p:cNvSpPr>
+            <a:spLocks noGrp="1"/>
+          </p:cNvSpPr>
+          <p:nvPr>
+            <p:ph type="title"/>
+          </p:nvPr>
+        </p:nvSpPr>
+        <p:spPr>
+          <a:xfrm>
             <a:off x="946951" y="213064"/>
             <a:ext cx="10298097" cy="1504257"/>
           </a:xfrm>
@@ -3619,7 +4257,10 @@
             <a:ext cx="550416" cy="372862"/>
           </a:xfrm>
           <a:prstGeom prst="cloudCallout">
-            <a:avLst/>
+            <a:avLst>
+              <a:gd name="adj1" fmla="val -23236"/>
+              <a:gd name="adj2" fmla="val 83499"/>
+            </a:avLst>
           </a:prstGeom>
         </p:spPr>
         <p:style>
@@ -3653,235 +4294,6 @@
     <p:extLst>
       <p:ext uri="{BB962C8B-B14F-4D97-AF65-F5344CB8AC3E}">
         <p14:creationId xmlns:p14="http://schemas.microsoft.com/office/powerpoint/2010/main" val="3844675703"/>
-      </p:ext>
-    </p:extLst>
-  </p:cSld>
-  <p:clrMapOvr>
-    <a:masterClrMapping/>
-  </p:clrMapOvr>
-</p:sld>
-</file>
-
-<file path=ppt/slides/slide11.xml><?xml version="1.0" encoding="utf-8"?>
-<p:sld xmlns:a="http://schemas.openxmlformats.org/drawingml/2006/main" xmlns:r="http://schemas.openxmlformats.org/officeDocument/2006/relationships" xmlns:p="http://schemas.openxmlformats.org/presentationml/2006/main">
-  <p:cSld>
-    <p:spTree>
-      <p:nvGrpSpPr>
-        <p:cNvPr id="1" name=""/>
-        <p:cNvGrpSpPr/>
-        <p:nvPr/>
-      </p:nvGrpSpPr>
-      <p:grpSpPr>
-        <a:xfrm>
-          <a:off x="0" y="0"/>
-          <a:ext cx="0" cy="0"/>
-          <a:chOff x="0" y="0"/>
-          <a:chExt cx="0" cy="0"/>
-        </a:xfrm>
-      </p:grpSpPr>
-      <p:sp>
-        <p:nvSpPr>
-          <p:cNvPr id="2" name="Заглавие 1">
-            <a:extLst>
-              <a:ext uri="{FF2B5EF4-FFF2-40B4-BE49-F238E27FC236}">
-                <a16:creationId xmlns:a16="http://schemas.microsoft.com/office/drawing/2014/main" id="{F78A924E-54DB-CA0D-5619-D5CAA2584F91}"/>
-              </a:ext>
-            </a:extLst>
-          </p:cNvPr>
-          <p:cNvSpPr>
-            <a:spLocks noGrp="1"/>
-          </p:cNvSpPr>
-          <p:nvPr>
-            <p:ph type="title"/>
-          </p:nvPr>
-        </p:nvSpPr>
-        <p:spPr>
-          <a:xfrm>
-            <a:off x="946951" y="213064"/>
-            <a:ext cx="10298097" cy="1504257"/>
-          </a:xfrm>
-        </p:spPr>
-        <p:txBody>
-          <a:bodyPr>
-            <a:normAutofit fontScale="90000"/>
-          </a:bodyPr>
-          <a:lstStyle/>
-          <a:p>
-            <a:pPr algn="ctr"/>
-            <a:r>
-              <a:rPr lang="bg-BG" b="0" i="0" u="none" strike="noStrike" dirty="0">
-                <a:solidFill>
-                  <a:srgbClr val="000000"/>
-                </a:solidFill>
-                <a:effectLst/>
-                <a:latin typeface="Times New Roman" panose="02020603050405020304" pitchFamily="18" charset="0"/>
-                <a:cs typeface="Times New Roman" panose="02020603050405020304" pitchFamily="18" charset="0"/>
-              </a:rPr>
-              <a:t>Променливи, условни оператори, цикли, масиви, функции</a:t>
-            </a:r>
-            <a:r>
-              <a:rPr lang="en-US" b="0" i="0" u="none" strike="noStrike" dirty="0">
-                <a:solidFill>
-                  <a:srgbClr val="000000"/>
-                </a:solidFill>
-                <a:effectLst/>
-                <a:latin typeface="Times New Roman" panose="02020603050405020304" pitchFamily="18" charset="0"/>
-                <a:cs typeface="Times New Roman" panose="02020603050405020304" pitchFamily="18" charset="0"/>
-              </a:rPr>
-              <a:t>:</a:t>
-            </a:r>
-            <a:br>
-              <a:rPr lang="en-US" sz="4400" b="0" i="0" u="none" strike="noStrike" dirty="0">
-                <a:solidFill>
-                  <a:srgbClr val="000000"/>
-                </a:solidFill>
-                <a:effectLst/>
-                <a:latin typeface="Times New Roman" panose="02020603050405020304" pitchFamily="18" charset="0"/>
-                <a:cs typeface="Times New Roman" panose="02020603050405020304" pitchFamily="18" charset="0"/>
-              </a:rPr>
-            </a:br>
-            <a:r>
-              <a:rPr lang="bg-BG" sz="4000" b="0" i="0" u="none" strike="noStrike" dirty="0">
-                <a:solidFill>
-                  <a:srgbClr val="000000"/>
-                </a:solidFill>
-                <a:effectLst/>
-                <a:latin typeface="Times New Roman" panose="02020603050405020304" pitchFamily="18" charset="0"/>
-                <a:cs typeface="Times New Roman" panose="02020603050405020304" pitchFamily="18" charset="0"/>
-              </a:rPr>
-              <a:t>Условни оператори</a:t>
-            </a:r>
-            <a:endParaRPr lang="en-US" sz="4000" dirty="0">
-              <a:latin typeface="Times New Roman" panose="02020603050405020304" pitchFamily="18" charset="0"/>
-              <a:cs typeface="Times New Roman" panose="02020603050405020304" pitchFamily="18" charset="0"/>
-            </a:endParaRPr>
-          </a:p>
-        </p:txBody>
-      </p:sp>
-      <p:sp>
-        <p:nvSpPr>
-          <p:cNvPr id="3" name="Контейнер за съдържание 2">
-            <a:extLst>
-              <a:ext uri="{FF2B5EF4-FFF2-40B4-BE49-F238E27FC236}">
-                <a16:creationId xmlns:a16="http://schemas.microsoft.com/office/drawing/2014/main" id="{1CDDA73A-43AD-5F72-946A-013AC5543BBE}"/>
-              </a:ext>
-            </a:extLst>
-          </p:cNvPr>
-          <p:cNvSpPr>
-            <a:spLocks noGrp="1"/>
-          </p:cNvSpPr>
-          <p:nvPr>
-            <p:ph idx="1"/>
-          </p:nvPr>
-        </p:nvSpPr>
-        <p:spPr>
-          <a:xfrm>
-            <a:off x="506027" y="1825625"/>
-            <a:ext cx="11105965" cy="4351338"/>
-          </a:xfrm>
-        </p:spPr>
-        <p:txBody>
-          <a:bodyPr>
-            <a:normAutofit/>
-          </a:bodyPr>
-          <a:lstStyle/>
-          <a:p>
-            <a:pPr marL="514350" indent="-514350">
-              <a:buFont typeface="+mj-lt"/>
-              <a:buAutoNum type="arabicPeriod" startAt="2"/>
-            </a:pPr>
-            <a:r>
-              <a:rPr lang="bg-BG" sz="2200" dirty="0">
-                <a:latin typeface="Arial" panose="020B0604020202020204" pitchFamily="34" charset="0"/>
-                <a:cs typeface="Arial" panose="020B0604020202020204" pitchFamily="34" charset="0"/>
-              </a:rPr>
-              <a:t>Условни оператори</a:t>
-            </a:r>
-          </a:p>
-        </p:txBody>
-      </p:sp>
-      <p:pic>
-        <p:nvPicPr>
-          <p:cNvPr id="24" name="Картина 23">
-            <a:extLst>
-              <a:ext uri="{FF2B5EF4-FFF2-40B4-BE49-F238E27FC236}">
-                <a16:creationId xmlns:a16="http://schemas.microsoft.com/office/drawing/2014/main" id="{AE00C8F6-4517-88B0-CB55-A67753FEFE8C}"/>
-              </a:ext>
-            </a:extLst>
-          </p:cNvPr>
-          <p:cNvPicPr>
-            <a:picLocks noChangeAspect="1"/>
-          </p:cNvPicPr>
-          <p:nvPr/>
-        </p:nvPicPr>
-        <p:blipFill>
-          <a:blip r:embed="rId2"/>
-          <a:stretch>
-            <a:fillRect/>
-          </a:stretch>
-        </p:blipFill>
-        <p:spPr>
-          <a:xfrm>
-            <a:off x="6269392" y="3895010"/>
-            <a:ext cx="5259743" cy="2638039"/>
-          </a:xfrm>
-          <a:prstGeom prst="rect">
-            <a:avLst/>
-          </a:prstGeom>
-        </p:spPr>
-      </p:pic>
-      <p:sp>
-        <p:nvSpPr>
-          <p:cNvPr id="25" name="Балонче за мисъл: облак 24">
-            <a:extLst>
-              <a:ext uri="{FF2B5EF4-FFF2-40B4-BE49-F238E27FC236}">
-                <a16:creationId xmlns:a16="http://schemas.microsoft.com/office/drawing/2014/main" id="{97DC9502-26FA-AB49-A7AD-3D981646B899}"/>
-              </a:ext>
-            </a:extLst>
-          </p:cNvPr>
-          <p:cNvSpPr/>
-          <p:nvPr/>
-        </p:nvSpPr>
-        <p:spPr>
-          <a:xfrm rot="1018643">
-            <a:off x="7466118" y="4607646"/>
-            <a:ext cx="550416" cy="372862"/>
-          </a:xfrm>
-          <a:prstGeom prst="cloudCallout">
-            <a:avLst/>
-          </a:prstGeom>
-        </p:spPr>
-        <p:style>
-          <a:lnRef idx="2">
-            <a:schemeClr val="dk1"/>
-          </a:lnRef>
-          <a:fillRef idx="1">
-            <a:schemeClr val="lt1"/>
-          </a:fillRef>
-          <a:effectRef idx="0">
-            <a:schemeClr val="dk1"/>
-          </a:effectRef>
-          <a:fontRef idx="minor">
-            <a:schemeClr val="dk1"/>
-          </a:fontRef>
-        </p:style>
-        <p:txBody>
-          <a:bodyPr rtlCol="0" anchor="ctr"/>
-          <a:lstStyle/>
-          <a:p>
-            <a:pPr algn="ctr"/>
-            <a:r>
-              <a:rPr lang="bg-BG" dirty="0"/>
-              <a:t>?</a:t>
-            </a:r>
-            <a:endParaRPr lang="en-US" dirty="0"/>
-          </a:p>
-        </p:txBody>
-      </p:sp>
-    </p:spTree>
-    <p:extLst>
-      <p:ext uri="{BB962C8B-B14F-4D97-AF65-F5344CB8AC3E}">
-        <p14:creationId xmlns:p14="http://schemas.microsoft.com/office/powerpoint/2010/main" val="2737617833"/>
       </p:ext>
     </p:extLst>
   </p:cSld>
@@ -3924,24 +4336,66 @@
             <p:ph type="title"/>
           </p:nvPr>
         </p:nvSpPr>
-        <p:spPr/>
+        <p:spPr>
+          <a:xfrm>
+            <a:off x="946951" y="213064"/>
+            <a:ext cx="10298097" cy="1504257"/>
+          </a:xfrm>
+        </p:spPr>
         <p:txBody>
           <a:bodyPr>
-            <a:normAutofit/>
+            <a:normAutofit fontScale="90000"/>
           </a:bodyPr>
           <a:lstStyle/>
           <a:p>
-            <a:r>
-              <a:rPr lang="bg-BG" sz="4400" b="0" i="0" u="none" strike="noStrike" dirty="0">
+            <a:pPr algn="ctr"/>
+            <a:r>
+              <a:rPr lang="bg-BG" b="0" i="0" u="none" strike="noStrike" dirty="0">
                 <a:solidFill>
                   <a:srgbClr val="000000"/>
                 </a:solidFill>
                 <a:effectLst/>
-                <a:latin typeface="Arial" panose="020B0604020202020204" pitchFamily="34" charset="0"/>
+                <a:latin typeface="Times New Roman" panose="02020603050405020304" pitchFamily="18" charset="0"/>
+                <a:cs typeface="Times New Roman" panose="02020603050405020304" pitchFamily="18" charset="0"/>
               </a:rPr>
               <a:t>Променливи, условни оператори, цикли, масиви, функции</a:t>
             </a:r>
-            <a:endParaRPr lang="en-US" dirty="0"/>
+            <a:r>
+              <a:rPr lang="en-US" b="0" i="0" u="none" strike="noStrike" dirty="0">
+                <a:solidFill>
+                  <a:srgbClr val="000000"/>
+                </a:solidFill>
+                <a:effectLst/>
+                <a:latin typeface="Times New Roman" panose="02020603050405020304" pitchFamily="18" charset="0"/>
+                <a:cs typeface="Times New Roman" panose="02020603050405020304" pitchFamily="18" charset="0"/>
+              </a:rPr>
+              <a:t>:</a:t>
+            </a:r>
+            <a:br>
+              <a:rPr lang="en-US" sz="4400" b="0" i="0" u="none" strike="noStrike" dirty="0">
+                <a:solidFill>
+                  <a:srgbClr val="000000"/>
+                </a:solidFill>
+                <a:effectLst/>
+                <a:latin typeface="Times New Roman" panose="02020603050405020304" pitchFamily="18" charset="0"/>
+                <a:cs typeface="Times New Roman" panose="02020603050405020304" pitchFamily="18" charset="0"/>
+              </a:rPr>
+            </a:br>
+            <a:r>
+              <a:rPr lang="bg-BG" sz="4000" b="0" i="0" u="none" strike="noStrike" dirty="0">
+                <a:solidFill>
+                  <a:srgbClr val="000000"/>
+                </a:solidFill>
+                <a:effectLst/>
+                <a:latin typeface="Times New Roman" panose="02020603050405020304" pitchFamily="18" charset="0"/>
+                <a:cs typeface="Times New Roman" panose="02020603050405020304" pitchFamily="18" charset="0"/>
+              </a:rPr>
+              <a:t>Условни оператори</a:t>
+            </a:r>
+            <a:endParaRPr lang="en-US" sz="4000" dirty="0">
+              <a:latin typeface="Times New Roman" panose="02020603050405020304" pitchFamily="18" charset="0"/>
+              <a:cs typeface="Times New Roman" panose="02020603050405020304" pitchFamily="18" charset="0"/>
+            </a:endParaRPr>
           </a:p>
         </p:txBody>
       </p:sp>
@@ -3961,33 +4415,351 @@
             <p:ph idx="1"/>
           </p:nvPr>
         </p:nvSpPr>
-        <p:spPr/>
-        <p:txBody>
-          <a:bodyPr/>
+        <p:spPr>
+          <a:xfrm>
+            <a:off x="506027" y="1825625"/>
+            <a:ext cx="11105965" cy="4351338"/>
+          </a:xfrm>
+        </p:spPr>
+        <p:txBody>
+          <a:bodyPr>
+            <a:normAutofit/>
+          </a:bodyPr>
           <a:lstStyle/>
           <a:p>
             <a:pPr marL="514350" indent="-514350">
               <a:buFont typeface="+mj-lt"/>
-              <a:buAutoNum type="arabicPeriod" startAt="3"/>
+              <a:buAutoNum type="arabicPeriod" startAt="2"/>
             </a:pPr>
             <a:r>
-              <a:rPr lang="bg-BG" sz="2800" b="0" i="0" u="none" strike="noStrike" dirty="0">
-                <a:solidFill>
-                  <a:srgbClr val="000000"/>
-                </a:solidFill>
-                <a:effectLst/>
-                <a:latin typeface="Arial" panose="020B0604020202020204" pitchFamily="34" charset="0"/>
-              </a:rPr>
-              <a:t>Цикли</a:t>
-            </a:r>
-            <a:endParaRPr lang="en-US" dirty="0"/>
-          </a:p>
-        </p:txBody>
-      </p:sp>
+              <a:rPr lang="bg-BG" sz="2200" dirty="0">
+                <a:latin typeface="Arial" panose="020B0604020202020204" pitchFamily="34" charset="0"/>
+                <a:cs typeface="Arial" panose="020B0604020202020204" pitchFamily="34" charset="0"/>
+              </a:rPr>
+              <a:t>Условни оператори</a:t>
+            </a:r>
+            <a:endParaRPr lang="en-US" sz="2200" dirty="0">
+              <a:latin typeface="Arial" panose="020B0604020202020204" pitchFamily="34" charset="0"/>
+              <a:cs typeface="Arial" panose="020B0604020202020204" pitchFamily="34" charset="0"/>
+            </a:endParaRPr>
+          </a:p>
+          <a:p>
+            <a:pPr lvl="1"/>
+            <a:r>
+              <a:rPr lang="bg-BG" sz="1800" dirty="0">
+                <a:latin typeface="Arial" panose="020B0604020202020204" pitchFamily="34" charset="0"/>
+                <a:cs typeface="Arial" panose="020B0604020202020204" pitchFamily="34" charset="0"/>
+              </a:rPr>
+              <a:t>Постоянно се използват;</a:t>
+            </a:r>
+          </a:p>
+          <a:p>
+            <a:pPr lvl="1"/>
+            <a:r>
+              <a:rPr lang="bg-BG" sz="1800" dirty="0">
+                <a:latin typeface="Arial" panose="020B0604020202020204" pitchFamily="34" charset="0"/>
+                <a:cs typeface="Arial" panose="020B0604020202020204" pitchFamily="34" charset="0"/>
+              </a:rPr>
+              <a:t>Служи за изпълняване на </a:t>
+            </a:r>
+            <a:r>
+              <a:rPr lang="bg-BG" sz="1800" u="sng" dirty="0">
+                <a:latin typeface="Arial" panose="020B0604020202020204" pitchFamily="34" charset="0"/>
+                <a:cs typeface="Arial" panose="020B0604020202020204" pitchFamily="34" charset="0"/>
+              </a:rPr>
+              <a:t>различни</a:t>
+            </a:r>
+            <a:r>
+              <a:rPr lang="bg-BG" sz="1800" dirty="0">
+                <a:latin typeface="Arial" panose="020B0604020202020204" pitchFamily="34" charset="0"/>
+                <a:cs typeface="Arial" panose="020B0604020202020204" pitchFamily="34" charset="0"/>
+              </a:rPr>
+              <a:t> събития в зависимост от </a:t>
+            </a:r>
+            <a:r>
+              <a:rPr lang="bg-BG" sz="1800" u="sng" dirty="0">
+                <a:latin typeface="Arial" panose="020B0604020202020204" pitchFamily="34" charset="0"/>
+                <a:cs typeface="Arial" panose="020B0604020202020204" pitchFamily="34" charset="0"/>
+              </a:rPr>
+              <a:t>резултата</a:t>
+            </a:r>
+            <a:r>
+              <a:rPr lang="bg-BG" sz="1800" dirty="0">
+                <a:latin typeface="Arial" panose="020B0604020202020204" pitchFamily="34" charset="0"/>
+                <a:cs typeface="Arial" panose="020B0604020202020204" pitchFamily="34" charset="0"/>
+              </a:rPr>
+              <a:t> на условието;</a:t>
+            </a:r>
+          </a:p>
+          <a:p>
+            <a:pPr lvl="1"/>
+            <a:r>
+              <a:rPr lang="bg-BG" sz="1800" dirty="0">
+                <a:latin typeface="Arial" panose="020B0604020202020204" pitchFamily="34" charset="0"/>
+                <a:cs typeface="Arial" panose="020B0604020202020204" pitchFamily="34" charset="0"/>
+              </a:rPr>
+              <a:t>Делят се на 2 вида: </a:t>
+            </a:r>
+            <a:r>
+              <a:rPr lang="bg-BG" sz="1800" u="sng" dirty="0">
+                <a:latin typeface="Arial" panose="020B0604020202020204" pitchFamily="34" charset="0"/>
+                <a:cs typeface="Arial" panose="020B0604020202020204" pitchFamily="34" charset="0"/>
+              </a:rPr>
+              <a:t>Аритметични</a:t>
+            </a:r>
+            <a:r>
+              <a:rPr lang="bg-BG" sz="1800" dirty="0">
+                <a:latin typeface="Arial" panose="020B0604020202020204" pitchFamily="34" charset="0"/>
+                <a:cs typeface="Arial" panose="020B0604020202020204" pitchFamily="34" charset="0"/>
+              </a:rPr>
+              <a:t> и </a:t>
+            </a:r>
+            <a:r>
+              <a:rPr lang="en-US" sz="1800" u="sng" dirty="0">
+                <a:latin typeface="Arial" panose="020B0604020202020204" pitchFamily="34" charset="0"/>
+                <a:cs typeface="Arial" panose="020B0604020202020204" pitchFamily="34" charset="0"/>
+              </a:rPr>
+              <a:t>String</a:t>
+            </a:r>
+            <a:r>
+              <a:rPr lang="en-US" sz="1800" dirty="0">
+                <a:latin typeface="Arial" panose="020B0604020202020204" pitchFamily="34" charset="0"/>
+                <a:cs typeface="Arial" panose="020B0604020202020204" pitchFamily="34" charset="0"/>
+              </a:rPr>
+              <a:t> </a:t>
+            </a:r>
+            <a:r>
+              <a:rPr lang="bg-BG" sz="1800" dirty="0">
+                <a:latin typeface="Arial" panose="020B0604020202020204" pitchFamily="34" charset="0"/>
+                <a:cs typeface="Arial" panose="020B0604020202020204" pitchFamily="34" charset="0"/>
+              </a:rPr>
+              <a:t>сравнения;</a:t>
+            </a:r>
+            <a:endParaRPr lang="en-US" sz="1800" dirty="0">
+              <a:latin typeface="Arial" panose="020B0604020202020204" pitchFamily="34" charset="0"/>
+              <a:cs typeface="Arial" panose="020B0604020202020204" pitchFamily="34" charset="0"/>
+            </a:endParaRPr>
+          </a:p>
+          <a:p>
+            <a:pPr marL="800100" lvl="1" indent="-342900">
+              <a:buFont typeface="+mj-lt"/>
+              <a:buAutoNum type="alphaLcParenR"/>
+            </a:pPr>
+            <a:r>
+              <a:rPr lang="bg-BG" sz="1800" dirty="0">
+                <a:latin typeface="Arial" panose="020B0604020202020204" pitchFamily="34" charset="0"/>
+                <a:cs typeface="Arial" panose="020B0604020202020204" pitchFamily="34" charset="0"/>
+              </a:rPr>
+              <a:t>Аритметични условни оператори (фиг. 1)</a:t>
+            </a:r>
+          </a:p>
+          <a:p>
+            <a:pPr lvl="2">
+              <a:buFont typeface="Courier New" panose="02070309020205020404" pitchFamily="49" charset="0"/>
+              <a:buChar char="o"/>
+            </a:pPr>
+            <a:r>
+              <a:rPr lang="bg-BG" sz="1600" dirty="0">
+                <a:latin typeface="Arial" panose="020B0604020202020204" pitchFamily="34" charset="0"/>
+                <a:cs typeface="Arial" panose="020B0604020202020204" pitchFamily="34" charset="0"/>
+              </a:rPr>
+              <a:t>Сравняват се </a:t>
+            </a:r>
+            <a:r>
+              <a:rPr lang="bg-BG" sz="1600" u="sng" dirty="0">
+                <a:latin typeface="Arial" panose="020B0604020202020204" pitchFamily="34" charset="0"/>
+                <a:cs typeface="Arial" panose="020B0604020202020204" pitchFamily="34" charset="0"/>
+              </a:rPr>
+              <a:t>цифри</a:t>
+            </a:r>
+          </a:p>
+          <a:p>
+            <a:pPr marL="800100" lvl="1" indent="-342900">
+              <a:buFont typeface="+mj-lt"/>
+              <a:buAutoNum type="alphaLcParenR"/>
+            </a:pPr>
+            <a:r>
+              <a:rPr lang="en-US" sz="1800" dirty="0">
+                <a:latin typeface="Arial" panose="020B0604020202020204" pitchFamily="34" charset="0"/>
+                <a:cs typeface="Arial" panose="020B0604020202020204" pitchFamily="34" charset="0"/>
+              </a:rPr>
+              <a:t>String </a:t>
+            </a:r>
+            <a:r>
+              <a:rPr lang="bg-BG" sz="1800" dirty="0">
+                <a:latin typeface="Arial" panose="020B0604020202020204" pitchFamily="34" charset="0"/>
+                <a:cs typeface="Arial" panose="020B0604020202020204" pitchFamily="34" charset="0"/>
+              </a:rPr>
+              <a:t>условни оператори (фиг. 2)</a:t>
+            </a:r>
+          </a:p>
+          <a:p>
+            <a:pPr lvl="2">
+              <a:buFont typeface="Courier New" panose="02070309020205020404" pitchFamily="49" charset="0"/>
+              <a:buChar char="o"/>
+            </a:pPr>
+            <a:r>
+              <a:rPr lang="bg-BG" sz="1600" dirty="0">
+                <a:latin typeface="Arial" panose="020B0604020202020204" pitchFamily="34" charset="0"/>
+                <a:cs typeface="Arial" panose="020B0604020202020204" pitchFamily="34" charset="0"/>
+              </a:rPr>
+              <a:t>Сравняват се </a:t>
+            </a:r>
+            <a:r>
+              <a:rPr lang="en-US" sz="1600" u="sng" dirty="0">
+                <a:latin typeface="Arial" panose="020B0604020202020204" pitchFamily="34" charset="0"/>
+                <a:cs typeface="Arial" panose="020B0604020202020204" pitchFamily="34" charset="0"/>
+              </a:rPr>
+              <a:t>String-</a:t>
+            </a:r>
+            <a:r>
+              <a:rPr lang="bg-BG" sz="1600" u="sng" dirty="0">
+                <a:latin typeface="Arial" panose="020B0604020202020204" pitchFamily="34" charset="0"/>
+                <a:cs typeface="Arial" panose="020B0604020202020204" pitchFamily="34" charset="0"/>
+              </a:rPr>
+              <a:t>ове</a:t>
+            </a:r>
+            <a:r>
+              <a:rPr lang="bg-BG" sz="1600" dirty="0">
+                <a:latin typeface="Arial" panose="020B0604020202020204" pitchFamily="34" charset="0"/>
+                <a:cs typeface="Arial" panose="020B0604020202020204" pitchFamily="34" charset="0"/>
+              </a:rPr>
+              <a:t> (текст)</a:t>
+            </a:r>
+          </a:p>
+        </p:txBody>
+      </p:sp>
+      <p:grpSp>
+        <p:nvGrpSpPr>
+          <p:cNvPr id="4" name="Group 3">
+            <a:extLst>
+              <a:ext uri="{FF2B5EF4-FFF2-40B4-BE49-F238E27FC236}">
+                <a16:creationId xmlns:a16="http://schemas.microsoft.com/office/drawing/2014/main" id="{DD73D11B-8488-0B0B-CDD4-DCF53613EAD6}"/>
+              </a:ext>
+            </a:extLst>
+          </p:cNvPr>
+          <p:cNvGrpSpPr/>
+          <p:nvPr/>
+        </p:nvGrpSpPr>
+        <p:grpSpPr>
+          <a:xfrm rot="350357">
+            <a:off x="7023981" y="4335918"/>
+            <a:ext cx="4148698" cy="1634244"/>
+            <a:chOff x="6320901" y="4535411"/>
+            <a:chExt cx="1738078" cy="684659"/>
+          </a:xfrm>
+        </p:grpSpPr>
+        <p:pic>
+          <p:nvPicPr>
+            <p:cNvPr id="24" name="Картина 23">
+              <a:extLst>
+                <a:ext uri="{FF2B5EF4-FFF2-40B4-BE49-F238E27FC236}">
+                  <a16:creationId xmlns:a16="http://schemas.microsoft.com/office/drawing/2014/main" id="{AE00C8F6-4517-88B0-CB55-A67753FEFE8C}"/>
+                </a:ext>
+              </a:extLst>
+            </p:cNvPr>
+            <p:cNvPicPr>
+              <a:picLocks noChangeAspect="1"/>
+            </p:cNvPicPr>
+            <p:nvPr/>
+          </p:nvPicPr>
+          <p:blipFill rotWithShape="1">
+            <a:blip r:embed="rId2"/>
+            <a:srcRect l="979" t="24275" r="65976" b="49771"/>
+            <a:stretch/>
+          </p:blipFill>
+          <p:spPr>
+            <a:xfrm>
+              <a:off x="6320901" y="4535411"/>
+              <a:ext cx="1738078" cy="684659"/>
+            </a:xfrm>
+            <a:prstGeom prst="rect">
+              <a:avLst/>
+            </a:prstGeom>
+            <a:ln w="190500" cap="sq">
+              <a:solidFill>
+                <a:srgbClr val="C8C6BD"/>
+              </a:solidFill>
+              <a:prstDash val="solid"/>
+              <a:miter lim="800000"/>
+            </a:ln>
+            <a:effectLst>
+              <a:outerShdw blurRad="254000" algn="bl" rotWithShape="0">
+                <a:srgbClr val="000000">
+                  <a:alpha val="43000"/>
+                </a:srgbClr>
+              </a:outerShdw>
+            </a:effectLst>
+            <a:scene3d>
+              <a:camera prst="perspectiveFront" fov="5400000"/>
+              <a:lightRig rig="threePt" dir="t">
+                <a:rot lat="0" lon="0" rev="2100000"/>
+              </a:lightRig>
+            </a:scene3d>
+            <a:sp3d extrusionH="25400">
+              <a:bevelT w="304800" h="152400" prst="hardEdge"/>
+              <a:extrusionClr>
+                <a:srgbClr val="000000"/>
+              </a:extrusionClr>
+            </a:sp3d>
+          </p:spPr>
+        </p:pic>
+        <p:sp>
+          <p:nvSpPr>
+            <p:cNvPr id="25" name="Балонче за мисъл: облак 24">
+              <a:extLst>
+                <a:ext uri="{FF2B5EF4-FFF2-40B4-BE49-F238E27FC236}">
+                  <a16:creationId xmlns:a16="http://schemas.microsoft.com/office/drawing/2014/main" id="{97DC9502-26FA-AB49-A7AD-3D981646B899}"/>
+                </a:ext>
+              </a:extLst>
+            </p:cNvPr>
+            <p:cNvSpPr/>
+            <p:nvPr/>
+          </p:nvSpPr>
+          <p:spPr>
+            <a:xfrm rot="1018643">
+              <a:off x="7466118" y="4607646"/>
+              <a:ext cx="550416" cy="372862"/>
+            </a:xfrm>
+            <a:prstGeom prst="cloudCallout">
+              <a:avLst>
+                <a:gd name="adj1" fmla="val -24446"/>
+                <a:gd name="adj2" fmla="val 81296"/>
+              </a:avLst>
+            </a:prstGeom>
+          </p:spPr>
+          <p:style>
+            <a:lnRef idx="2">
+              <a:schemeClr val="dk1"/>
+            </a:lnRef>
+            <a:fillRef idx="1">
+              <a:schemeClr val="lt1"/>
+            </a:fillRef>
+            <a:effectRef idx="0">
+              <a:schemeClr val="dk1"/>
+            </a:effectRef>
+            <a:fontRef idx="minor">
+              <a:schemeClr val="dk1"/>
+            </a:fontRef>
+          </p:style>
+          <p:txBody>
+            <a:bodyPr rtlCol="0" anchor="ctr"/>
+            <a:lstStyle/>
+            <a:p>
+              <a:pPr algn="ctr"/>
+              <a:r>
+                <a:rPr lang="bg-BG" dirty="0"/>
+                <a:t>?</a:t>
+              </a:r>
+              <a:endParaRPr lang="en-US" dirty="0"/>
+            </a:p>
+          </p:txBody>
+        </p:sp>
+      </p:grpSp>
     </p:spTree>
     <p:extLst>
       <p:ext uri="{BB962C8B-B14F-4D97-AF65-F5344CB8AC3E}">
-        <p14:creationId xmlns:p14="http://schemas.microsoft.com/office/powerpoint/2010/main" val="3457635739"/>
+        <p14:creationId xmlns:p14="http://schemas.microsoft.com/office/powerpoint/2010/main" val="2737617833"/>
       </p:ext>
     </p:extLst>
   </p:cSld>
@@ -4030,70 +4802,472 @@
             <p:ph type="title"/>
           </p:nvPr>
         </p:nvSpPr>
-        <p:spPr/>
+        <p:spPr>
+          <a:xfrm>
+            <a:off x="946951" y="213064"/>
+            <a:ext cx="10298097" cy="1504257"/>
+          </a:xfrm>
+        </p:spPr>
         <p:txBody>
           <a:bodyPr>
-            <a:normAutofit/>
+            <a:normAutofit fontScale="90000"/>
           </a:bodyPr>
           <a:lstStyle/>
           <a:p>
-            <a:r>
-              <a:rPr lang="bg-BG" sz="4400" b="0" i="0" u="none" strike="noStrike" dirty="0">
+            <a:pPr algn="ctr"/>
+            <a:r>
+              <a:rPr lang="bg-BG" b="0" i="0" u="none" strike="noStrike" dirty="0">
                 <a:solidFill>
                   <a:srgbClr val="000000"/>
                 </a:solidFill>
                 <a:effectLst/>
-                <a:latin typeface="Arial" panose="020B0604020202020204" pitchFamily="34" charset="0"/>
+                <a:latin typeface="Times New Roman" panose="02020603050405020304" pitchFamily="18" charset="0"/>
+                <a:cs typeface="Times New Roman" panose="02020603050405020304" pitchFamily="18" charset="0"/>
               </a:rPr>
               <a:t>Променливи, условни оператори, цикли, масиви, функции</a:t>
             </a:r>
-            <a:endParaRPr lang="en-US" dirty="0"/>
-          </a:p>
-        </p:txBody>
-      </p:sp>
-      <p:sp>
-        <p:nvSpPr>
-          <p:cNvPr id="3" name="Контейнер за съдържание 2">
+            <a:r>
+              <a:rPr lang="en-US" b="0" i="0" u="none" strike="noStrike" dirty="0">
+                <a:solidFill>
+                  <a:srgbClr val="000000"/>
+                </a:solidFill>
+                <a:effectLst/>
+                <a:latin typeface="Times New Roman" panose="02020603050405020304" pitchFamily="18" charset="0"/>
+                <a:cs typeface="Times New Roman" panose="02020603050405020304" pitchFamily="18" charset="0"/>
+              </a:rPr>
+              <a:t>:</a:t>
+            </a:r>
+            <a:br>
+              <a:rPr lang="en-US" sz="4400" b="0" i="0" u="none" strike="noStrike" dirty="0">
+                <a:solidFill>
+                  <a:srgbClr val="000000"/>
+                </a:solidFill>
+                <a:effectLst/>
+                <a:latin typeface="Times New Roman" panose="02020603050405020304" pitchFamily="18" charset="0"/>
+                <a:cs typeface="Times New Roman" panose="02020603050405020304" pitchFamily="18" charset="0"/>
+              </a:rPr>
+            </a:br>
+            <a:r>
+              <a:rPr lang="bg-BG" sz="4000" b="0" i="0" u="none" strike="noStrike" dirty="0">
+                <a:solidFill>
+                  <a:srgbClr val="000000"/>
+                </a:solidFill>
+                <a:effectLst/>
+                <a:latin typeface="Times New Roman" panose="02020603050405020304" pitchFamily="18" charset="0"/>
+                <a:cs typeface="Times New Roman" panose="02020603050405020304" pitchFamily="18" charset="0"/>
+              </a:rPr>
+              <a:t>Условни оператори</a:t>
+            </a:r>
+            <a:endParaRPr lang="en-US" sz="4000" dirty="0">
+              <a:latin typeface="Times New Roman" panose="02020603050405020304" pitchFamily="18" charset="0"/>
+              <a:cs typeface="Times New Roman" panose="02020603050405020304" pitchFamily="18" charset="0"/>
+            </a:endParaRPr>
+          </a:p>
+        </p:txBody>
+      </p:sp>
+      <p:grpSp>
+        <p:nvGrpSpPr>
+          <p:cNvPr id="30" name="Group 29">
             <a:extLst>
               <a:ext uri="{FF2B5EF4-FFF2-40B4-BE49-F238E27FC236}">
-                <a16:creationId xmlns:a16="http://schemas.microsoft.com/office/drawing/2014/main" id="{1CDDA73A-43AD-5F72-946A-013AC5543BBE}"/>
+                <a16:creationId xmlns:a16="http://schemas.microsoft.com/office/drawing/2014/main" id="{219EE1AC-CF56-2470-3338-C1A3CAA7DA8F}"/>
               </a:ext>
             </a:extLst>
           </p:cNvPr>
-          <p:cNvSpPr>
-            <a:spLocks noGrp="1"/>
-          </p:cNvSpPr>
-          <p:nvPr>
-            <p:ph idx="1"/>
-          </p:nvPr>
-        </p:nvSpPr>
-        <p:spPr/>
-        <p:txBody>
-          <a:bodyPr/>
+          <p:cNvGrpSpPr/>
+          <p:nvPr/>
+        </p:nvGrpSpPr>
+        <p:grpSpPr>
+          <a:xfrm>
+            <a:off x="6296718" y="1920679"/>
+            <a:ext cx="4598495" cy="2686050"/>
+            <a:chOff x="7166730" y="3882814"/>
+            <a:chExt cx="4598495" cy="2686050"/>
+          </a:xfrm>
+        </p:grpSpPr>
+        <p:pic>
+          <p:nvPicPr>
+            <p:cNvPr id="16" name="Picture 15">
+              <a:extLst>
+                <a:ext uri="{FF2B5EF4-FFF2-40B4-BE49-F238E27FC236}">
+                  <a16:creationId xmlns:a16="http://schemas.microsoft.com/office/drawing/2014/main" id="{FFA6F53A-5B33-767F-FCB6-C946CC6ABE23}"/>
+                </a:ext>
+              </a:extLst>
+            </p:cNvPr>
+            <p:cNvPicPr>
+              <a:picLocks noChangeAspect="1"/>
+            </p:cNvPicPr>
+            <p:nvPr/>
+          </p:nvPicPr>
+          <p:blipFill rotWithShape="1">
+            <a:blip r:embed="rId2"/>
+            <a:srcRect r="9422"/>
+            <a:stretch/>
+          </p:blipFill>
+          <p:spPr>
+            <a:xfrm>
+              <a:off x="7166730" y="3882814"/>
+              <a:ext cx="4598495" cy="2686050"/>
+            </a:xfrm>
+            <a:prstGeom prst="rect">
+              <a:avLst/>
+            </a:prstGeom>
+          </p:spPr>
+        </p:pic>
+        <p:cxnSp>
+          <p:nvCxnSpPr>
+            <p:cNvPr id="21" name="Straight Connector 20">
+              <a:extLst>
+                <a:ext uri="{FF2B5EF4-FFF2-40B4-BE49-F238E27FC236}">
+                  <a16:creationId xmlns:a16="http://schemas.microsoft.com/office/drawing/2014/main" id="{008C889A-1076-413C-5A20-76E7EE16C15D}"/>
+                </a:ext>
+              </a:extLst>
+            </p:cNvPr>
+            <p:cNvCxnSpPr>
+              <a:cxnSpLocks/>
+            </p:cNvCxnSpPr>
+            <p:nvPr/>
+          </p:nvCxnSpPr>
+          <p:spPr>
+            <a:xfrm>
+              <a:off x="11757827" y="3909448"/>
+              <a:ext cx="7398" cy="2606765"/>
+            </a:xfrm>
+            <a:prstGeom prst="line">
+              <a:avLst/>
+            </a:prstGeom>
+            <a:ln>
+              <a:solidFill>
+                <a:srgbClr val="E6E6E6"/>
+              </a:solidFill>
+            </a:ln>
+          </p:spPr>
+          <p:style>
+            <a:lnRef idx="1">
+              <a:schemeClr val="accent1"/>
+            </a:lnRef>
+            <a:fillRef idx="0">
+              <a:schemeClr val="accent1"/>
+            </a:fillRef>
+            <a:effectRef idx="0">
+              <a:schemeClr val="accent1"/>
+            </a:effectRef>
+            <a:fontRef idx="minor">
+              <a:schemeClr val="tx1"/>
+            </a:fontRef>
+          </p:style>
+        </p:cxnSp>
+      </p:grpSp>
+      <p:sp>
+        <p:nvSpPr>
+          <p:cNvPr id="32" name="TextBox 31">
+            <a:extLst>
+              <a:ext uri="{FF2B5EF4-FFF2-40B4-BE49-F238E27FC236}">
+                <a16:creationId xmlns:a16="http://schemas.microsoft.com/office/drawing/2014/main" id="{33C07A25-6C22-F38A-362B-EEB157083E4D}"/>
+              </a:ext>
+            </a:extLst>
+          </p:cNvPr>
+          <p:cNvSpPr txBox="1"/>
+          <p:nvPr/>
+        </p:nvSpPr>
+        <p:spPr>
+          <a:xfrm>
+            <a:off x="10990501" y="1920679"/>
+            <a:ext cx="767326" cy="369332"/>
+          </a:xfrm>
+          <a:prstGeom prst="rect">
+            <a:avLst/>
+          </a:prstGeom>
+          <a:noFill/>
+        </p:spPr>
+        <p:txBody>
+          <a:bodyPr wrap="none" rtlCol="0">
+            <a:spAutoFit/>
+          </a:bodyPr>
           <a:lstStyle/>
           <a:p>
-            <a:pPr marL="514350" indent="-514350">
-              <a:buFont typeface="+mj-lt"/>
-              <a:buAutoNum type="arabicPeriod" startAt="4"/>
-            </a:pPr>
-            <a:r>
-              <a:rPr lang="bg-BG" sz="2800" b="0" i="0" u="none" strike="noStrike" dirty="0">
-                <a:solidFill>
-                  <a:srgbClr val="000000"/>
-                </a:solidFill>
-                <a:effectLst/>
-                <a:latin typeface="Arial" panose="020B0604020202020204" pitchFamily="34" charset="0"/>
-              </a:rPr>
-              <a:t>Масиви</a:t>
-            </a:r>
-            <a:endParaRPr lang="en-US" dirty="0"/>
+            <a:r>
+              <a:rPr lang="bg-BG" dirty="0"/>
+              <a:t>Фиг. 2</a:t>
+            </a:r>
+          </a:p>
+        </p:txBody>
+      </p:sp>
+      <p:sp>
+        <p:nvSpPr>
+          <p:cNvPr id="33" name="TextBox 32">
+            <a:extLst>
+              <a:ext uri="{FF2B5EF4-FFF2-40B4-BE49-F238E27FC236}">
+                <a16:creationId xmlns:a16="http://schemas.microsoft.com/office/drawing/2014/main" id="{7F86CA56-0B1E-04DB-F108-FE2B4018B9A6}"/>
+              </a:ext>
+            </a:extLst>
+          </p:cNvPr>
+          <p:cNvSpPr txBox="1"/>
+          <p:nvPr/>
+        </p:nvSpPr>
+        <p:spPr>
+          <a:xfrm>
+            <a:off x="426775" y="4267777"/>
+            <a:ext cx="767326" cy="369332"/>
+          </a:xfrm>
+          <a:prstGeom prst="rect">
+            <a:avLst/>
+          </a:prstGeom>
+          <a:noFill/>
+        </p:spPr>
+        <p:txBody>
+          <a:bodyPr wrap="none" rtlCol="0">
+            <a:spAutoFit/>
+          </a:bodyPr>
+          <a:lstStyle/>
+          <a:p>
+            <a:r>
+              <a:rPr lang="bg-BG" dirty="0"/>
+              <a:t>Фиг. 1</a:t>
+            </a:r>
+          </a:p>
+        </p:txBody>
+      </p:sp>
+      <p:sp>
+        <p:nvSpPr>
+          <p:cNvPr id="34" name="TextBox 33">
+            <a:extLst>
+              <a:ext uri="{FF2B5EF4-FFF2-40B4-BE49-F238E27FC236}">
+                <a16:creationId xmlns:a16="http://schemas.microsoft.com/office/drawing/2014/main" id="{FF17F750-EB32-56B6-641F-F3F0DB7B38A6}"/>
+              </a:ext>
+            </a:extLst>
+          </p:cNvPr>
+          <p:cNvSpPr txBox="1"/>
+          <p:nvPr/>
+        </p:nvSpPr>
+        <p:spPr>
+          <a:xfrm>
+            <a:off x="5579776" y="4918494"/>
+            <a:ext cx="5066579" cy="646331"/>
+          </a:xfrm>
+          <a:prstGeom prst="rect">
+            <a:avLst/>
+          </a:prstGeom>
+          <a:noFill/>
+        </p:spPr>
+        <p:txBody>
+          <a:bodyPr wrap="square" rtlCol="0">
+            <a:spAutoFit/>
+          </a:bodyPr>
+          <a:lstStyle/>
+          <a:p>
+            <a:r>
+              <a:rPr lang="bg-BG" dirty="0">
+                <a:solidFill>
+                  <a:srgbClr val="FF0000"/>
+                </a:solidFill>
+              </a:rPr>
+              <a:t>*</a:t>
+            </a:r>
+            <a:r>
+              <a:rPr lang="bg-BG" dirty="0"/>
+              <a:t> </a:t>
+            </a:r>
+            <a:r>
+              <a:rPr lang="bg-BG" dirty="0">
+                <a:latin typeface="Arial" panose="020B0604020202020204" pitchFamily="34" charset="0"/>
+                <a:cs typeface="Arial" panose="020B0604020202020204" pitchFamily="34" charset="0"/>
+              </a:rPr>
+              <a:t>Оператор</a:t>
+            </a:r>
+            <a:r>
+              <a:rPr lang="bg-BG" dirty="0"/>
+              <a:t> </a:t>
+            </a:r>
+            <a:r>
+              <a:rPr lang="en-US" b="1" dirty="0">
+                <a:latin typeface="poppins" panose="00000500000000000000" pitchFamily="2" charset="0"/>
+                <a:cs typeface="poppins" panose="00000500000000000000" pitchFamily="2" charset="0"/>
+              </a:rPr>
+              <a:t>=~ </a:t>
+            </a:r>
+            <a:r>
+              <a:rPr lang="bg-BG" dirty="0">
+                <a:latin typeface="Arial" panose="020B0604020202020204" pitchFamily="34" charset="0"/>
+                <a:cs typeface="Arial" panose="020B0604020202020204" pitchFamily="34" charset="0"/>
+              </a:rPr>
+              <a:t>се използва за сравняване на подадена променлива с регулярен израз</a:t>
+            </a:r>
+            <a:endParaRPr lang="bg-BG" b="1" dirty="0">
+              <a:latin typeface="Arial" panose="020B0604020202020204" pitchFamily="34" charset="0"/>
+              <a:cs typeface="Arial" panose="020B0604020202020204" pitchFamily="34" charset="0"/>
+            </a:endParaRPr>
+          </a:p>
+        </p:txBody>
+      </p:sp>
+      <p:pic>
+        <p:nvPicPr>
+          <p:cNvPr id="36" name="Picture 35">
+            <a:extLst>
+              <a:ext uri="{FF2B5EF4-FFF2-40B4-BE49-F238E27FC236}">
+                <a16:creationId xmlns:a16="http://schemas.microsoft.com/office/drawing/2014/main" id="{0574A045-62C7-1D0A-F4E0-30A9CFB02C68}"/>
+              </a:ext>
+            </a:extLst>
+          </p:cNvPr>
+          <p:cNvPicPr>
+            <a:picLocks noChangeAspect="1"/>
+          </p:cNvPicPr>
+          <p:nvPr/>
+        </p:nvPicPr>
+        <p:blipFill>
+          <a:blip r:embed="rId3"/>
+          <a:stretch>
+            <a:fillRect/>
+          </a:stretch>
+        </p:blipFill>
+        <p:spPr>
+          <a:xfrm>
+            <a:off x="2250095" y="5036257"/>
+            <a:ext cx="3143250" cy="1447800"/>
+          </a:xfrm>
+          <a:prstGeom prst="rect">
+            <a:avLst/>
+          </a:prstGeom>
+          <a:solidFill>
+            <a:srgbClr val="FFFFFF">
+              <a:shade val="85000"/>
+            </a:srgbClr>
+          </a:solidFill>
+          <a:ln w="88900" cap="sq">
+            <a:solidFill>
+              <a:srgbClr val="FFFFFF"/>
+            </a:solidFill>
+            <a:miter lim="800000"/>
+          </a:ln>
+          <a:effectLst>
+            <a:outerShdw blurRad="55000" dist="18000" dir="5400000" algn="tl" rotWithShape="0">
+              <a:srgbClr val="000000">
+                <a:alpha val="40000"/>
+              </a:srgbClr>
+            </a:outerShdw>
+          </a:effectLst>
+          <a:scene3d>
+            <a:camera prst="orthographicFront"/>
+            <a:lightRig rig="twoPt" dir="t">
+              <a:rot lat="0" lon="0" rev="7200000"/>
+            </a:lightRig>
+          </a:scene3d>
+          <a:sp3d>
+            <a:bevelT w="25400" h="19050"/>
+            <a:contourClr>
+              <a:srgbClr val="FFFFFF"/>
+            </a:contourClr>
+          </a:sp3d>
+        </p:spPr>
+      </p:pic>
+      <p:pic>
+        <p:nvPicPr>
+          <p:cNvPr id="38" name="Picture 37">
+            <a:extLst>
+              <a:ext uri="{FF2B5EF4-FFF2-40B4-BE49-F238E27FC236}">
+                <a16:creationId xmlns:a16="http://schemas.microsoft.com/office/drawing/2014/main" id="{62D57797-C6CA-32E7-C880-6E857ECC18C9}"/>
+              </a:ext>
+            </a:extLst>
+          </p:cNvPr>
+          <p:cNvPicPr>
+            <a:picLocks noChangeAspect="1"/>
+          </p:cNvPicPr>
+          <p:nvPr/>
+        </p:nvPicPr>
+        <p:blipFill>
+          <a:blip r:embed="rId4">
+            <a:extLst>
+              <a:ext uri="{28A0092B-C50C-407E-A947-70E740481C1C}">
+                <a14:useLocalDpi xmlns:a14="http://schemas.microsoft.com/office/drawing/2010/main" val="0"/>
+              </a:ext>
+            </a:extLst>
+          </a:blip>
+          <a:stretch>
+            <a:fillRect/>
+          </a:stretch>
+        </p:blipFill>
+        <p:spPr>
+          <a:xfrm>
+            <a:off x="426775" y="1920679"/>
+            <a:ext cx="4099265" cy="2297898"/>
+          </a:xfrm>
+          <a:prstGeom prst="rect">
+            <a:avLst/>
+          </a:prstGeom>
+        </p:spPr>
+      </p:pic>
+      <p:sp>
+        <p:nvSpPr>
+          <p:cNvPr id="39" name="TextBox 38">
+            <a:extLst>
+              <a:ext uri="{FF2B5EF4-FFF2-40B4-BE49-F238E27FC236}">
+                <a16:creationId xmlns:a16="http://schemas.microsoft.com/office/drawing/2014/main" id="{F10554C1-16D6-5640-B855-C0152EF55098}"/>
+              </a:ext>
+            </a:extLst>
+          </p:cNvPr>
+          <p:cNvSpPr txBox="1"/>
+          <p:nvPr/>
+        </p:nvSpPr>
+        <p:spPr>
+          <a:xfrm>
+            <a:off x="5579776" y="5760157"/>
+            <a:ext cx="5410725" cy="738664"/>
+          </a:xfrm>
+          <a:prstGeom prst="rect">
+            <a:avLst/>
+          </a:prstGeom>
+          <a:noFill/>
+        </p:spPr>
+        <p:txBody>
+          <a:bodyPr wrap="square" rtlCol="0">
+            <a:spAutoFit/>
+          </a:bodyPr>
+          <a:lstStyle/>
+          <a:p>
+            <a:r>
+              <a:rPr lang="bg-BG" sz="1400" dirty="0">
+                <a:solidFill>
+                  <a:srgbClr val="FF0000"/>
+                </a:solidFill>
+              </a:rPr>
+              <a:t>*</a:t>
+            </a:r>
+            <a:r>
+              <a:rPr lang="bg-BG" sz="1400" dirty="0"/>
+              <a:t> </a:t>
+            </a:r>
+            <a:r>
+              <a:rPr lang="bg-BG" sz="1400" dirty="0">
+                <a:latin typeface="Arial" panose="020B0604020202020204" pitchFamily="34" charset="0"/>
+                <a:cs typeface="Arial" panose="020B0604020202020204" pitchFamily="34" charset="0"/>
+              </a:rPr>
+              <a:t>Този код проверява дали аргумент 2, който е подаден при извикване на </a:t>
+            </a:r>
+            <a:r>
+              <a:rPr lang="en-US" sz="1400" dirty="0">
+                <a:latin typeface="Arial" panose="020B0604020202020204" pitchFamily="34" charset="0"/>
+                <a:cs typeface="Arial" panose="020B0604020202020204" pitchFamily="34" charset="0"/>
+              </a:rPr>
+              <a:t>bash script</a:t>
+            </a:r>
+            <a:r>
+              <a:rPr lang="bg-BG" sz="1400" dirty="0">
+                <a:latin typeface="Arial" panose="020B0604020202020204" pitchFamily="34" charset="0"/>
+                <a:cs typeface="Arial" panose="020B0604020202020204" pitchFamily="34" charset="0"/>
+              </a:rPr>
+              <a:t>-а, като команда, е число, използвайки регулярен израз</a:t>
+            </a:r>
+            <a:endParaRPr lang="bg-BG" sz="1400" b="1" dirty="0">
+              <a:latin typeface="Arial" panose="020B0604020202020204" pitchFamily="34" charset="0"/>
+              <a:cs typeface="Arial" panose="020B0604020202020204" pitchFamily="34" charset="0"/>
+            </a:endParaRPr>
           </a:p>
         </p:txBody>
       </p:sp>
     </p:spTree>
     <p:extLst>
       <p:ext uri="{BB962C8B-B14F-4D97-AF65-F5344CB8AC3E}">
-        <p14:creationId xmlns:p14="http://schemas.microsoft.com/office/powerpoint/2010/main" val="2880647231"/>
+        <p14:creationId xmlns:p14="http://schemas.microsoft.com/office/powerpoint/2010/main" val="3123636646"/>
       </p:ext>
     </p:extLst>
   </p:cSld>
@@ -4136,24 +5310,66 @@
             <p:ph type="title"/>
           </p:nvPr>
         </p:nvSpPr>
-        <p:spPr/>
+        <p:spPr>
+          <a:xfrm>
+            <a:off x="946951" y="213064"/>
+            <a:ext cx="10298097" cy="1504257"/>
+          </a:xfrm>
+        </p:spPr>
         <p:txBody>
           <a:bodyPr>
-            <a:normAutofit/>
+            <a:normAutofit fontScale="90000"/>
           </a:bodyPr>
           <a:lstStyle/>
           <a:p>
-            <a:r>
-              <a:rPr lang="bg-BG" sz="4400" b="0" i="0" u="none" strike="noStrike" dirty="0">
+            <a:pPr algn="ctr"/>
+            <a:r>
+              <a:rPr lang="bg-BG" b="0" i="0" u="none" strike="noStrike" dirty="0">
                 <a:solidFill>
                   <a:srgbClr val="000000"/>
                 </a:solidFill>
                 <a:effectLst/>
-                <a:latin typeface="Arial" panose="020B0604020202020204" pitchFamily="34" charset="0"/>
+                <a:latin typeface="Times New Roman" panose="02020603050405020304" pitchFamily="18" charset="0"/>
+                <a:cs typeface="Times New Roman" panose="02020603050405020304" pitchFamily="18" charset="0"/>
               </a:rPr>
               <a:t>Променливи, условни оператори, цикли, масиви, функции</a:t>
             </a:r>
-            <a:endParaRPr lang="en-US" dirty="0"/>
+            <a:r>
+              <a:rPr lang="en-US" b="0" i="0" u="none" strike="noStrike" dirty="0">
+                <a:solidFill>
+                  <a:srgbClr val="000000"/>
+                </a:solidFill>
+                <a:effectLst/>
+                <a:latin typeface="Times New Roman" panose="02020603050405020304" pitchFamily="18" charset="0"/>
+                <a:cs typeface="Times New Roman" panose="02020603050405020304" pitchFamily="18" charset="0"/>
+              </a:rPr>
+              <a:t>:</a:t>
+            </a:r>
+            <a:br>
+              <a:rPr lang="en-US" sz="4400" b="0" i="0" u="none" strike="noStrike" dirty="0">
+                <a:solidFill>
+                  <a:srgbClr val="000000"/>
+                </a:solidFill>
+                <a:effectLst/>
+                <a:latin typeface="Times New Roman" panose="02020603050405020304" pitchFamily="18" charset="0"/>
+                <a:cs typeface="Times New Roman" panose="02020603050405020304" pitchFamily="18" charset="0"/>
+              </a:rPr>
+            </a:br>
+            <a:r>
+              <a:rPr lang="bg-BG" sz="4000" b="0" i="0" u="none" strike="noStrike" dirty="0">
+                <a:solidFill>
+                  <a:srgbClr val="000000"/>
+                </a:solidFill>
+                <a:effectLst/>
+                <a:latin typeface="Times New Roman" panose="02020603050405020304" pitchFamily="18" charset="0"/>
+                <a:cs typeface="Times New Roman" panose="02020603050405020304" pitchFamily="18" charset="0"/>
+              </a:rPr>
+              <a:t>Условни оператори</a:t>
+            </a:r>
+            <a:endParaRPr lang="en-US" sz="4000" dirty="0">
+              <a:latin typeface="Times New Roman" panose="02020603050405020304" pitchFamily="18" charset="0"/>
+              <a:cs typeface="Times New Roman" panose="02020603050405020304" pitchFamily="18" charset="0"/>
+            </a:endParaRPr>
           </a:p>
         </p:txBody>
       </p:sp>
@@ -4173,33 +5389,40 @@
             <p:ph idx="1"/>
           </p:nvPr>
         </p:nvSpPr>
-        <p:spPr/>
-        <p:txBody>
-          <a:bodyPr/>
+        <p:spPr>
+          <a:xfrm>
+            <a:off x="506027" y="1825625"/>
+            <a:ext cx="11105965" cy="4351338"/>
+          </a:xfrm>
+        </p:spPr>
+        <p:txBody>
+          <a:bodyPr>
+            <a:normAutofit/>
+          </a:bodyPr>
           <a:lstStyle/>
           <a:p>
             <a:pPr marL="514350" indent="-514350">
               <a:buFont typeface="+mj-lt"/>
-              <a:buAutoNum type="arabicPeriod" startAt="5"/>
+              <a:buAutoNum type="arabicPeriod" startAt="3"/>
             </a:pPr>
             <a:r>
-              <a:rPr lang="bg-BG" sz="2800" b="0" i="0" u="none" strike="noStrike" dirty="0">
-                <a:solidFill>
-                  <a:srgbClr val="000000"/>
-                </a:solidFill>
-                <a:effectLst/>
-                <a:latin typeface="Arial" panose="020B0604020202020204" pitchFamily="34" charset="0"/>
-              </a:rPr>
-              <a:t>Функции</a:t>
-            </a:r>
-            <a:endParaRPr lang="en-US" dirty="0"/>
+              <a:rPr lang="bg-BG" sz="2200" dirty="0">
+                <a:latin typeface="Arial" panose="020B0604020202020204" pitchFamily="34" charset="0"/>
+                <a:cs typeface="Arial" panose="020B0604020202020204" pitchFamily="34" charset="0"/>
+              </a:rPr>
+              <a:t>Пример за прилагане на условен оператор</a:t>
+            </a:r>
+            <a:endParaRPr lang="en-US" sz="2200" dirty="0">
+              <a:latin typeface="Arial" panose="020B0604020202020204" pitchFamily="34" charset="0"/>
+              <a:cs typeface="Arial" panose="020B0604020202020204" pitchFamily="34" charset="0"/>
+            </a:endParaRPr>
           </a:p>
         </p:txBody>
       </p:sp>
     </p:spTree>
     <p:extLst>
       <p:ext uri="{BB962C8B-B14F-4D97-AF65-F5344CB8AC3E}">
-        <p14:creationId xmlns:p14="http://schemas.microsoft.com/office/powerpoint/2010/main" val="916271556"/>
+        <p14:creationId xmlns:p14="http://schemas.microsoft.com/office/powerpoint/2010/main" val="3883185505"/>
       </p:ext>
     </p:extLst>
   </p:cSld>
@@ -4231,6 +5454,324 @@
           <p:cNvPr id="2" name="Заглавие 1">
             <a:extLst>
               <a:ext uri="{FF2B5EF4-FFF2-40B4-BE49-F238E27FC236}">
+                <a16:creationId xmlns:a16="http://schemas.microsoft.com/office/drawing/2014/main" id="{F78A924E-54DB-CA0D-5619-D5CAA2584F91}"/>
+              </a:ext>
+            </a:extLst>
+          </p:cNvPr>
+          <p:cNvSpPr>
+            <a:spLocks noGrp="1"/>
+          </p:cNvSpPr>
+          <p:nvPr>
+            <p:ph type="title"/>
+          </p:nvPr>
+        </p:nvSpPr>
+        <p:spPr/>
+        <p:txBody>
+          <a:bodyPr>
+            <a:normAutofit/>
+          </a:bodyPr>
+          <a:lstStyle/>
+          <a:p>
+            <a:r>
+              <a:rPr lang="bg-BG" sz="4400" b="0" i="0" u="none" strike="noStrike" dirty="0">
+                <a:solidFill>
+                  <a:srgbClr val="000000"/>
+                </a:solidFill>
+                <a:effectLst/>
+                <a:latin typeface="Arial" panose="020B0604020202020204" pitchFamily="34" charset="0"/>
+              </a:rPr>
+              <a:t>Променливи, условни оператори, цикли, масиви, функции</a:t>
+            </a:r>
+            <a:endParaRPr lang="en-US" dirty="0"/>
+          </a:p>
+        </p:txBody>
+      </p:sp>
+      <p:sp>
+        <p:nvSpPr>
+          <p:cNvPr id="3" name="Контейнер за съдържание 2">
+            <a:extLst>
+              <a:ext uri="{FF2B5EF4-FFF2-40B4-BE49-F238E27FC236}">
+                <a16:creationId xmlns:a16="http://schemas.microsoft.com/office/drawing/2014/main" id="{1CDDA73A-43AD-5F72-946A-013AC5543BBE}"/>
+              </a:ext>
+            </a:extLst>
+          </p:cNvPr>
+          <p:cNvSpPr>
+            <a:spLocks noGrp="1"/>
+          </p:cNvSpPr>
+          <p:nvPr>
+            <p:ph idx="1"/>
+          </p:nvPr>
+        </p:nvSpPr>
+        <p:spPr/>
+        <p:txBody>
+          <a:bodyPr/>
+          <a:lstStyle/>
+          <a:p>
+            <a:pPr marL="514350" indent="-514350">
+              <a:buFont typeface="+mj-lt"/>
+              <a:buAutoNum type="arabicPeriod" startAt="3"/>
+            </a:pPr>
+            <a:r>
+              <a:rPr lang="bg-BG" sz="2800" b="0" i="0" u="none" strike="noStrike" dirty="0">
+                <a:solidFill>
+                  <a:srgbClr val="000000"/>
+                </a:solidFill>
+                <a:effectLst/>
+                <a:latin typeface="Arial" panose="020B0604020202020204" pitchFamily="34" charset="0"/>
+              </a:rPr>
+              <a:t>Цикли</a:t>
+            </a:r>
+            <a:endParaRPr lang="en-US" dirty="0"/>
+          </a:p>
+        </p:txBody>
+      </p:sp>
+    </p:spTree>
+    <p:extLst>
+      <p:ext uri="{BB962C8B-B14F-4D97-AF65-F5344CB8AC3E}">
+        <p14:creationId xmlns:p14="http://schemas.microsoft.com/office/powerpoint/2010/main" val="3457635739"/>
+      </p:ext>
+    </p:extLst>
+  </p:cSld>
+  <p:clrMapOvr>
+    <a:masterClrMapping/>
+  </p:clrMapOvr>
+</p:sld>
+</file>
+
+<file path=ppt/slides/slide16.xml><?xml version="1.0" encoding="utf-8"?>
+<p:sld xmlns:a="http://schemas.openxmlformats.org/drawingml/2006/main" xmlns:r="http://schemas.openxmlformats.org/officeDocument/2006/relationships" xmlns:p="http://schemas.openxmlformats.org/presentationml/2006/main">
+  <p:cSld>
+    <p:spTree>
+      <p:nvGrpSpPr>
+        <p:cNvPr id="1" name=""/>
+        <p:cNvGrpSpPr/>
+        <p:nvPr/>
+      </p:nvGrpSpPr>
+      <p:grpSpPr>
+        <a:xfrm>
+          <a:off x="0" y="0"/>
+          <a:ext cx="0" cy="0"/>
+          <a:chOff x="0" y="0"/>
+          <a:chExt cx="0" cy="0"/>
+        </a:xfrm>
+      </p:grpSpPr>
+      <p:sp>
+        <p:nvSpPr>
+          <p:cNvPr id="2" name="Заглавие 1">
+            <a:extLst>
+              <a:ext uri="{FF2B5EF4-FFF2-40B4-BE49-F238E27FC236}">
+                <a16:creationId xmlns:a16="http://schemas.microsoft.com/office/drawing/2014/main" id="{F78A924E-54DB-CA0D-5619-D5CAA2584F91}"/>
+              </a:ext>
+            </a:extLst>
+          </p:cNvPr>
+          <p:cNvSpPr>
+            <a:spLocks noGrp="1"/>
+          </p:cNvSpPr>
+          <p:nvPr>
+            <p:ph type="title"/>
+          </p:nvPr>
+        </p:nvSpPr>
+        <p:spPr/>
+        <p:txBody>
+          <a:bodyPr>
+            <a:normAutofit/>
+          </a:bodyPr>
+          <a:lstStyle/>
+          <a:p>
+            <a:r>
+              <a:rPr lang="bg-BG" sz="4400" b="0" i="0" u="none" strike="noStrike" dirty="0">
+                <a:solidFill>
+                  <a:srgbClr val="000000"/>
+                </a:solidFill>
+                <a:effectLst/>
+                <a:latin typeface="Arial" panose="020B0604020202020204" pitchFamily="34" charset="0"/>
+              </a:rPr>
+              <a:t>Променливи, условни оператори, цикли, масиви, функции</a:t>
+            </a:r>
+            <a:endParaRPr lang="en-US" dirty="0"/>
+          </a:p>
+        </p:txBody>
+      </p:sp>
+      <p:sp>
+        <p:nvSpPr>
+          <p:cNvPr id="3" name="Контейнер за съдържание 2">
+            <a:extLst>
+              <a:ext uri="{FF2B5EF4-FFF2-40B4-BE49-F238E27FC236}">
+                <a16:creationId xmlns:a16="http://schemas.microsoft.com/office/drawing/2014/main" id="{1CDDA73A-43AD-5F72-946A-013AC5543BBE}"/>
+              </a:ext>
+            </a:extLst>
+          </p:cNvPr>
+          <p:cNvSpPr>
+            <a:spLocks noGrp="1"/>
+          </p:cNvSpPr>
+          <p:nvPr>
+            <p:ph idx="1"/>
+          </p:nvPr>
+        </p:nvSpPr>
+        <p:spPr/>
+        <p:txBody>
+          <a:bodyPr/>
+          <a:lstStyle/>
+          <a:p>
+            <a:pPr marL="514350" indent="-514350">
+              <a:buFont typeface="+mj-lt"/>
+              <a:buAutoNum type="arabicPeriod" startAt="4"/>
+            </a:pPr>
+            <a:r>
+              <a:rPr lang="bg-BG" sz="2800" b="0" i="0" u="none" strike="noStrike" dirty="0">
+                <a:solidFill>
+                  <a:srgbClr val="000000"/>
+                </a:solidFill>
+                <a:effectLst/>
+                <a:latin typeface="Arial" panose="020B0604020202020204" pitchFamily="34" charset="0"/>
+              </a:rPr>
+              <a:t>Масиви</a:t>
+            </a:r>
+            <a:endParaRPr lang="en-US" dirty="0"/>
+          </a:p>
+        </p:txBody>
+      </p:sp>
+    </p:spTree>
+    <p:extLst>
+      <p:ext uri="{BB962C8B-B14F-4D97-AF65-F5344CB8AC3E}">
+        <p14:creationId xmlns:p14="http://schemas.microsoft.com/office/powerpoint/2010/main" val="2880647231"/>
+      </p:ext>
+    </p:extLst>
+  </p:cSld>
+  <p:clrMapOvr>
+    <a:masterClrMapping/>
+  </p:clrMapOvr>
+</p:sld>
+</file>
+
+<file path=ppt/slides/slide17.xml><?xml version="1.0" encoding="utf-8"?>
+<p:sld xmlns:a="http://schemas.openxmlformats.org/drawingml/2006/main" xmlns:r="http://schemas.openxmlformats.org/officeDocument/2006/relationships" xmlns:p="http://schemas.openxmlformats.org/presentationml/2006/main">
+  <p:cSld>
+    <p:spTree>
+      <p:nvGrpSpPr>
+        <p:cNvPr id="1" name=""/>
+        <p:cNvGrpSpPr/>
+        <p:nvPr/>
+      </p:nvGrpSpPr>
+      <p:grpSpPr>
+        <a:xfrm>
+          <a:off x="0" y="0"/>
+          <a:ext cx="0" cy="0"/>
+          <a:chOff x="0" y="0"/>
+          <a:chExt cx="0" cy="0"/>
+        </a:xfrm>
+      </p:grpSpPr>
+      <p:sp>
+        <p:nvSpPr>
+          <p:cNvPr id="2" name="Заглавие 1">
+            <a:extLst>
+              <a:ext uri="{FF2B5EF4-FFF2-40B4-BE49-F238E27FC236}">
+                <a16:creationId xmlns:a16="http://schemas.microsoft.com/office/drawing/2014/main" id="{F78A924E-54DB-CA0D-5619-D5CAA2584F91}"/>
+              </a:ext>
+            </a:extLst>
+          </p:cNvPr>
+          <p:cNvSpPr>
+            <a:spLocks noGrp="1"/>
+          </p:cNvSpPr>
+          <p:nvPr>
+            <p:ph type="title"/>
+          </p:nvPr>
+        </p:nvSpPr>
+        <p:spPr/>
+        <p:txBody>
+          <a:bodyPr>
+            <a:normAutofit/>
+          </a:bodyPr>
+          <a:lstStyle/>
+          <a:p>
+            <a:r>
+              <a:rPr lang="bg-BG" sz="4400" b="0" i="0" u="none" strike="noStrike" dirty="0">
+                <a:solidFill>
+                  <a:srgbClr val="000000"/>
+                </a:solidFill>
+                <a:effectLst/>
+                <a:latin typeface="Arial" panose="020B0604020202020204" pitchFamily="34" charset="0"/>
+              </a:rPr>
+              <a:t>Променливи, условни оператори, цикли, масиви, функции</a:t>
+            </a:r>
+            <a:endParaRPr lang="en-US" dirty="0"/>
+          </a:p>
+        </p:txBody>
+      </p:sp>
+      <p:sp>
+        <p:nvSpPr>
+          <p:cNvPr id="3" name="Контейнер за съдържание 2">
+            <a:extLst>
+              <a:ext uri="{FF2B5EF4-FFF2-40B4-BE49-F238E27FC236}">
+                <a16:creationId xmlns:a16="http://schemas.microsoft.com/office/drawing/2014/main" id="{1CDDA73A-43AD-5F72-946A-013AC5543BBE}"/>
+              </a:ext>
+            </a:extLst>
+          </p:cNvPr>
+          <p:cNvSpPr>
+            <a:spLocks noGrp="1"/>
+          </p:cNvSpPr>
+          <p:nvPr>
+            <p:ph idx="1"/>
+          </p:nvPr>
+        </p:nvSpPr>
+        <p:spPr/>
+        <p:txBody>
+          <a:bodyPr/>
+          <a:lstStyle/>
+          <a:p>
+            <a:pPr marL="514350" indent="-514350">
+              <a:buFont typeface="+mj-lt"/>
+              <a:buAutoNum type="arabicPeriod" startAt="5"/>
+            </a:pPr>
+            <a:r>
+              <a:rPr lang="bg-BG" sz="2800" b="0" i="0" u="none" strike="noStrike" dirty="0">
+                <a:solidFill>
+                  <a:srgbClr val="000000"/>
+                </a:solidFill>
+                <a:effectLst/>
+                <a:latin typeface="Arial" panose="020B0604020202020204" pitchFamily="34" charset="0"/>
+              </a:rPr>
+              <a:t>Функции</a:t>
+            </a:r>
+            <a:endParaRPr lang="en-US" dirty="0"/>
+          </a:p>
+        </p:txBody>
+      </p:sp>
+    </p:spTree>
+    <p:extLst>
+      <p:ext uri="{BB962C8B-B14F-4D97-AF65-F5344CB8AC3E}">
+        <p14:creationId xmlns:p14="http://schemas.microsoft.com/office/powerpoint/2010/main" val="916271556"/>
+      </p:ext>
+    </p:extLst>
+  </p:cSld>
+  <p:clrMapOvr>
+    <a:masterClrMapping/>
+  </p:clrMapOvr>
+</p:sld>
+</file>
+
+<file path=ppt/slides/slide18.xml><?xml version="1.0" encoding="utf-8"?>
+<p:sld xmlns:a="http://schemas.openxmlformats.org/drawingml/2006/main" xmlns:r="http://schemas.openxmlformats.org/officeDocument/2006/relationships" xmlns:p="http://schemas.openxmlformats.org/presentationml/2006/main">
+  <p:cSld>
+    <p:spTree>
+      <p:nvGrpSpPr>
+        <p:cNvPr id="1" name=""/>
+        <p:cNvGrpSpPr/>
+        <p:nvPr/>
+      </p:nvGrpSpPr>
+      <p:grpSpPr>
+        <a:xfrm>
+          <a:off x="0" y="0"/>
+          <a:ext cx="0" cy="0"/>
+          <a:chOff x="0" y="0"/>
+          <a:chExt cx="0" cy="0"/>
+        </a:xfrm>
+      </p:grpSpPr>
+      <p:sp>
+        <p:nvSpPr>
+          <p:cNvPr id="2" name="Заглавие 1">
+            <a:extLst>
+              <a:ext uri="{FF2B5EF4-FFF2-40B4-BE49-F238E27FC236}">
                 <a16:creationId xmlns:a16="http://schemas.microsoft.com/office/drawing/2014/main" id="{F38B8A0D-0974-0183-9356-9AE7E96D968F}"/>
               </a:ext>
             </a:extLst>
@@ -4299,7 +5840,7 @@
 </p:sld>
 </file>
 
-<file path=ppt/slides/slide16.xml><?xml version="1.0" encoding="utf-8"?>
+<file path=ppt/slides/slide19.xml><?xml version="1.0" encoding="utf-8"?>
 <p:sld xmlns:a="http://schemas.openxmlformats.org/drawingml/2006/main" xmlns:r="http://schemas.openxmlformats.org/officeDocument/2006/relationships" xmlns:p="http://schemas.openxmlformats.org/presentationml/2006/main">
   <p:cSld>
     <p:spTree>
@@ -8420,8 +9961,8 @@
         </p:nvSpPr>
         <p:spPr>
           <a:xfrm>
-            <a:off x="946951" y="337351"/>
-            <a:ext cx="10298097" cy="1384917"/>
+            <a:off x="838200" y="174241"/>
+            <a:ext cx="10515600" cy="1606288"/>
           </a:xfrm>
         </p:spPr>
         <p:txBody>
@@ -8472,7 +10013,7 @@
                 <a:latin typeface="Times New Roman" panose="02020603050405020304" pitchFamily="18" charset="0"/>
                 <a:cs typeface="Times New Roman" panose="02020603050405020304" pitchFamily="18" charset="0"/>
               </a:rPr>
-              <a:t>Условни оператори</a:t>
+              <a:t>Променливи</a:t>
             </a:r>
             <a:endParaRPr lang="en-US" sz="4000" dirty="0">
               <a:latin typeface="Times New Roman" panose="02020603050405020304" pitchFamily="18" charset="0"/>
@@ -8483,534 +10024,252 @@
       </p:sp>
       <p:sp>
         <p:nvSpPr>
-          <p:cNvPr id="3" name="Контейнер за съдържание 2">
+          <p:cNvPr id="14" name="Контейнер за съдържание 2">
             <a:extLst>
               <a:ext uri="{FF2B5EF4-FFF2-40B4-BE49-F238E27FC236}">
-                <a16:creationId xmlns:a16="http://schemas.microsoft.com/office/drawing/2014/main" id="{1CDDA73A-43AD-5F72-946A-013AC5543BBE}"/>
+                <a16:creationId xmlns:a16="http://schemas.microsoft.com/office/drawing/2014/main" id="{2960A87A-1298-2830-15AE-3B92B00B5DA6}"/>
               </a:ext>
             </a:extLst>
           </p:cNvPr>
-          <p:cNvSpPr>
-            <a:spLocks noGrp="1"/>
+          <p:cNvSpPr txBox="1">
+            <a:spLocks/>
           </p:cNvSpPr>
-          <p:nvPr>
-            <p:ph idx="1"/>
-          </p:nvPr>
+          <p:nvPr/>
         </p:nvSpPr>
         <p:spPr>
           <a:xfrm>
-            <a:off x="470515" y="1868242"/>
-            <a:ext cx="9001957" cy="4459642"/>
-          </a:xfrm>
-        </p:spPr>
-        <p:txBody>
-          <a:bodyPr>
-            <a:normAutofit/>
-          </a:bodyPr>
-          <a:lstStyle/>
-          <a:p>
-            <a:pPr marL="514350" indent="-514350">
-              <a:buFont typeface="+mj-lt"/>
-              <a:buAutoNum type="arabicPeriod"/>
-            </a:pPr>
-            <a:r>
-              <a:rPr lang="bg-BG" sz="2200" dirty="0">
-                <a:latin typeface="Arial" panose="020B0604020202020204" pitchFamily="34" charset="0"/>
-                <a:cs typeface="Arial" panose="020B0604020202020204" pitchFamily="34" charset="0"/>
-              </a:rPr>
-              <a:t>Условие (</a:t>
-            </a:r>
-            <a:r>
-              <a:rPr lang="en-US" sz="2200" dirty="0">
-                <a:latin typeface="Arial" panose="020B0604020202020204" pitchFamily="34" charset="0"/>
-                <a:cs typeface="Arial" panose="020B0604020202020204" pitchFamily="34" charset="0"/>
-              </a:rPr>
-              <a:t>If – else if – else</a:t>
-            </a:r>
-            <a:r>
-              <a:rPr lang="bg-BG" sz="2200" dirty="0">
-                <a:latin typeface="Arial" panose="020B0604020202020204" pitchFamily="34" charset="0"/>
-                <a:cs typeface="Arial" panose="020B0604020202020204" pitchFamily="34" charset="0"/>
-              </a:rPr>
-              <a:t>)</a:t>
-            </a:r>
-            <a:endParaRPr lang="en-US" sz="2200" dirty="0">
-              <a:latin typeface="Arial" panose="020B0604020202020204" pitchFamily="34" charset="0"/>
-              <a:cs typeface="Arial" panose="020B0604020202020204" pitchFamily="34" charset="0"/>
-            </a:endParaRPr>
-          </a:p>
-          <a:p>
-            <a:pPr lvl="1"/>
-            <a:r>
-              <a:rPr lang="bg-BG" sz="1800" dirty="0">
-                <a:latin typeface="Arial" panose="020B0604020202020204" pitchFamily="34" charset="0"/>
-                <a:cs typeface="Arial" panose="020B0604020202020204" pitchFamily="34" charset="0"/>
-              </a:rPr>
-              <a:t>Често срещан случай в програмирането;</a:t>
-            </a:r>
-          </a:p>
-          <a:p>
-            <a:pPr lvl="1"/>
-            <a:r>
-              <a:rPr lang="bg-BG" sz="1800" dirty="0">
-                <a:latin typeface="Arial" panose="020B0604020202020204" pitchFamily="34" charset="0"/>
-                <a:cs typeface="Arial" panose="020B0604020202020204" pitchFamily="34" charset="0"/>
-              </a:rPr>
-              <a:t>Използва се когато искаме да </a:t>
-            </a:r>
-            <a:r>
-              <a:rPr lang="bg-BG" sz="1800" u="sng" dirty="0">
-                <a:latin typeface="Arial" panose="020B0604020202020204" pitchFamily="34" charset="0"/>
-                <a:cs typeface="Arial" panose="020B0604020202020204" pitchFamily="34" charset="0"/>
-              </a:rPr>
-              <a:t>оценим</a:t>
-            </a:r>
-            <a:r>
-              <a:rPr lang="bg-BG" sz="1800" dirty="0">
-                <a:latin typeface="Arial" panose="020B0604020202020204" pitchFamily="34" charset="0"/>
-                <a:cs typeface="Arial" panose="020B0604020202020204" pitchFamily="34" charset="0"/>
-              </a:rPr>
-              <a:t> дадено условие и на база </a:t>
-            </a:r>
-            <a:r>
-              <a:rPr lang="bg-BG" sz="1800" u="sng" dirty="0">
-                <a:latin typeface="Arial" panose="020B0604020202020204" pitchFamily="34" charset="0"/>
-                <a:cs typeface="Arial" panose="020B0604020202020204" pitchFamily="34" charset="0"/>
-              </a:rPr>
-              <a:t>резултата</a:t>
-            </a:r>
-            <a:r>
-              <a:rPr lang="bg-BG" sz="1800" dirty="0">
-                <a:latin typeface="Arial" panose="020B0604020202020204" pitchFamily="34" charset="0"/>
-                <a:cs typeface="Arial" panose="020B0604020202020204" pitchFamily="34" charset="0"/>
-              </a:rPr>
-              <a:t> да изпълним един набор от между 2 или повече набора оператори;</a:t>
-            </a:r>
-            <a:endParaRPr lang="en-US" sz="1800" dirty="0">
-              <a:latin typeface="Arial" panose="020B0604020202020204" pitchFamily="34" charset="0"/>
-              <a:cs typeface="Arial" panose="020B0604020202020204" pitchFamily="34" charset="0"/>
-            </a:endParaRPr>
-          </a:p>
-          <a:p>
-            <a:pPr lvl="1"/>
-            <a:r>
-              <a:rPr lang="bg-BG" sz="1800" dirty="0">
-                <a:latin typeface="Arial" panose="020B0604020202020204" pitchFamily="34" charset="0"/>
-                <a:cs typeface="Arial" panose="020B0604020202020204" pitchFamily="34" charset="0"/>
-              </a:rPr>
-              <a:t>За да работи проверката, условието трябва да е </a:t>
-            </a:r>
-            <a:r>
-              <a:rPr lang="bg-BG" sz="1800" u="sng" dirty="0">
-                <a:latin typeface="Arial" panose="020B0604020202020204" pitchFamily="34" charset="0"/>
-                <a:cs typeface="Arial" panose="020B0604020202020204" pitchFamily="34" charset="0"/>
-              </a:rPr>
-              <a:t>отделено</a:t>
-            </a:r>
-            <a:r>
-              <a:rPr lang="bg-BG" sz="1800" dirty="0">
-                <a:latin typeface="Arial" panose="020B0604020202020204" pitchFamily="34" charset="0"/>
-                <a:cs typeface="Arial" panose="020B0604020202020204" pitchFamily="34" charset="0"/>
-              </a:rPr>
-              <a:t> с </a:t>
-            </a:r>
-            <a:r>
-              <a:rPr lang="bg-BG" sz="1800" u="sng" dirty="0">
-                <a:latin typeface="Arial" panose="020B0604020202020204" pitchFamily="34" charset="0"/>
-                <a:cs typeface="Arial" panose="020B0604020202020204" pitchFamily="34" charset="0"/>
-              </a:rPr>
-              <a:t>интервали</a:t>
-            </a:r>
-            <a:r>
-              <a:rPr lang="bg-BG" sz="1800" dirty="0">
-                <a:latin typeface="Arial" panose="020B0604020202020204" pitchFamily="34" charset="0"/>
-                <a:cs typeface="Arial" panose="020B0604020202020204" pitchFamily="34" charset="0"/>
-              </a:rPr>
-              <a:t> вътре в </a:t>
-            </a:r>
-            <a:r>
-              <a:rPr lang="bg-BG" sz="1800" u="sng" dirty="0">
-                <a:latin typeface="Arial" panose="020B0604020202020204" pitchFamily="34" charset="0"/>
-                <a:cs typeface="Arial" panose="020B0604020202020204" pitchFamily="34" charset="0"/>
-              </a:rPr>
-              <a:t>скобите</a:t>
-            </a:r>
-            <a:r>
-              <a:rPr lang="bg-BG" sz="1800" dirty="0">
-                <a:latin typeface="Arial" panose="020B0604020202020204" pitchFamily="34" charset="0"/>
-                <a:cs typeface="Arial" panose="020B0604020202020204" pitchFamily="34" charset="0"/>
-              </a:rPr>
-              <a:t>, които са </a:t>
-            </a:r>
-            <a:r>
-              <a:rPr lang="bg-BG" sz="1800" u="sng" dirty="0">
-                <a:latin typeface="Arial" panose="020B0604020202020204" pitchFamily="34" charset="0"/>
-                <a:cs typeface="Arial" panose="020B0604020202020204" pitchFamily="34" charset="0"/>
-              </a:rPr>
-              <a:t>квадратни</a:t>
-            </a:r>
-            <a:r>
-              <a:rPr lang="bg-BG" sz="1800" dirty="0">
-                <a:latin typeface="Arial" panose="020B0604020202020204" pitchFamily="34" charset="0"/>
-                <a:cs typeface="Arial" panose="020B0604020202020204" pitchFamily="34" charset="0"/>
-              </a:rPr>
-              <a:t> </a:t>
-            </a:r>
-            <a:r>
-              <a:rPr lang="en-US" sz="1800" b="1" dirty="0">
-                <a:latin typeface="poppins" panose="00000500000000000000" pitchFamily="2" charset="0"/>
-                <a:cs typeface="poppins" panose="00000500000000000000" pitchFamily="2" charset="0"/>
-              </a:rPr>
-              <a:t>[</a:t>
-            </a:r>
-            <a:r>
-              <a:rPr lang="bg-BG" sz="1800" b="1" dirty="0">
-                <a:latin typeface="Arial" panose="020B0604020202020204" pitchFamily="34" charset="0"/>
-                <a:cs typeface="poppins" panose="00000500000000000000" pitchFamily="2" charset="0"/>
-              </a:rPr>
-              <a:t> </a:t>
-            </a:r>
-            <a:r>
-              <a:rPr lang="en-US" sz="1800" b="1" dirty="0">
-                <a:latin typeface="poppins" panose="00000500000000000000" pitchFamily="2" charset="0"/>
-                <a:cs typeface="poppins" panose="00000500000000000000" pitchFamily="2" charset="0"/>
-              </a:rPr>
-              <a:t>]</a:t>
-            </a:r>
-            <a:r>
-              <a:rPr lang="bg-BG" sz="1800" b="1" dirty="0">
-                <a:latin typeface="Arial" panose="020B0604020202020204" pitchFamily="34" charset="0"/>
-                <a:cs typeface="poppins" panose="00000500000000000000" pitchFamily="2" charset="0"/>
-              </a:rPr>
-              <a:t> </a:t>
-            </a:r>
-            <a:r>
-              <a:rPr lang="bg-BG" sz="1800" dirty="0">
-                <a:latin typeface="Arial" panose="020B0604020202020204" pitchFamily="34" charset="0"/>
-                <a:cs typeface="Arial" panose="020B0604020202020204" pitchFamily="34" charset="0"/>
-              </a:rPr>
-              <a:t>, а ключовата дума </a:t>
-            </a:r>
-            <a:r>
-              <a:rPr lang="en-US" sz="1800" dirty="0">
-                <a:latin typeface="Arial" panose="020B0604020202020204" pitchFamily="34" charset="0"/>
-                <a:cs typeface="Arial" panose="020B0604020202020204" pitchFamily="34" charset="0"/>
-              </a:rPr>
-              <a:t>if </a:t>
-            </a:r>
-            <a:r>
-              <a:rPr lang="bg-BG" sz="1800" dirty="0">
-                <a:latin typeface="Arial" panose="020B0604020202020204" pitchFamily="34" charset="0"/>
-                <a:cs typeface="Arial" panose="020B0604020202020204" pitchFamily="34" charset="0"/>
-              </a:rPr>
-              <a:t>също е </a:t>
-            </a:r>
-            <a:r>
-              <a:rPr lang="bg-BG" sz="1800" u="sng" dirty="0">
-                <a:latin typeface="Arial" panose="020B0604020202020204" pitchFamily="34" charset="0"/>
-                <a:cs typeface="Arial" panose="020B0604020202020204" pitchFamily="34" charset="0"/>
-              </a:rPr>
-              <a:t>отделена</a:t>
-            </a:r>
-            <a:r>
-              <a:rPr lang="bg-BG" sz="1800" dirty="0">
-                <a:latin typeface="Arial" panose="020B0604020202020204" pitchFamily="34" charset="0"/>
-                <a:cs typeface="Arial" panose="020B0604020202020204" pitchFamily="34" charset="0"/>
-              </a:rPr>
-              <a:t> с интервал от тях (фиг. 1);</a:t>
-            </a:r>
-          </a:p>
-        </p:txBody>
-      </p:sp>
-      <p:pic>
-        <p:nvPicPr>
-          <p:cNvPr id="12" name="Картина 11">
-            <a:extLst>
-              <a:ext uri="{FF2B5EF4-FFF2-40B4-BE49-F238E27FC236}">
-                <a16:creationId xmlns:a16="http://schemas.microsoft.com/office/drawing/2014/main" id="{75E97404-80B6-8DB4-C2D0-9611EE9C5754}"/>
-              </a:ext>
-            </a:extLst>
-          </p:cNvPr>
-          <p:cNvPicPr>
-            <a:picLocks noChangeAspect="1"/>
-          </p:cNvPicPr>
-          <p:nvPr/>
-        </p:nvPicPr>
-        <p:blipFill>
-          <a:blip r:embed="rId2">
-            <a:extLst>
-              <a:ext uri="{28A0092B-C50C-407E-A947-70E740481C1C}">
-                <a14:useLocalDpi xmlns:a14="http://schemas.microsoft.com/office/drawing/2010/main" val="0"/>
-              </a:ext>
-            </a:extLst>
-          </a:blip>
-          <a:stretch>
-            <a:fillRect/>
-          </a:stretch>
-        </p:blipFill>
-        <p:spPr>
-          <a:xfrm>
-            <a:off x="9397102" y="1331651"/>
-            <a:ext cx="2364241" cy="1869028"/>
+            <a:off x="435007" y="1895911"/>
+            <a:ext cx="11178154" cy="2533476"/>
           </a:xfrm>
           <a:prstGeom prst="rect">
             <a:avLst/>
           </a:prstGeom>
-          <a:ln>
-            <a:noFill/>
-          </a:ln>
-          <a:effectLst>
-            <a:reflection blurRad="12700" stA="30000" endPos="30000" dist="5000" dir="5400000" sy="-100000" algn="bl" rotWithShape="0"/>
-          </a:effectLst>
-          <a:scene3d>
-            <a:camera prst="perspectiveContrastingLeftFacing">
-              <a:rot lat="300000" lon="19800000" rev="0"/>
-            </a:camera>
-            <a:lightRig rig="threePt" dir="t">
-              <a:rot lat="0" lon="0" rev="2700000"/>
-            </a:lightRig>
-          </a:scene3d>
-          <a:sp3d>
-            <a:bevelT w="63500" h="50800"/>
-          </a:sp3d>
         </p:spPr>
-      </p:pic>
-      <p:pic>
-        <p:nvPicPr>
-          <p:cNvPr id="14" name="Картина 13">
-            <a:extLst>
-              <a:ext uri="{FF2B5EF4-FFF2-40B4-BE49-F238E27FC236}">
-                <a16:creationId xmlns:a16="http://schemas.microsoft.com/office/drawing/2014/main" id="{16B80901-4F77-82DC-DD53-6FCA8831973F}"/>
-              </a:ext>
-            </a:extLst>
-          </p:cNvPr>
-          <p:cNvPicPr>
-            <a:picLocks noChangeAspect="1"/>
-          </p:cNvPicPr>
-          <p:nvPr/>
-        </p:nvPicPr>
-        <p:blipFill rotWithShape="1">
-          <a:blip r:embed="rId3">
-            <a:extLst>
-              <a:ext uri="{28A0092B-C50C-407E-A947-70E740481C1C}">
-                <a14:useLocalDpi xmlns:a14="http://schemas.microsoft.com/office/drawing/2010/main" val="0"/>
-              </a:ext>
-            </a:extLst>
-          </a:blip>
-          <a:srcRect l="9033" t="7720" r="5000" b="3457"/>
-          <a:stretch/>
-        </p:blipFill>
-        <p:spPr>
-          <a:xfrm>
-            <a:off x="6291537" y="3937758"/>
-            <a:ext cx="5394436" cy="2565646"/>
-          </a:xfrm>
-          <a:prstGeom prst="rect">
-            <a:avLst/>
-          </a:prstGeom>
-          <a:ln w="38100" cap="sq">
-            <a:solidFill>
-              <a:srgbClr val="000000"/>
-            </a:solidFill>
-            <a:prstDash val="solid"/>
-            <a:miter lim="800000"/>
-          </a:ln>
-          <a:effectLst>
-            <a:outerShdw blurRad="50800" dist="38100" dir="2700000" algn="tl" rotWithShape="0">
-              <a:srgbClr val="000000">
-                <a:alpha val="43000"/>
-              </a:srgbClr>
-            </a:outerShdw>
-          </a:effectLst>
-        </p:spPr>
-      </p:pic>
-      <p:sp>
-        <p:nvSpPr>
-          <p:cNvPr id="16" name="Текстово поле 15">
-            <a:extLst>
-              <a:ext uri="{FF2B5EF4-FFF2-40B4-BE49-F238E27FC236}">
-                <a16:creationId xmlns:a16="http://schemas.microsoft.com/office/drawing/2014/main" id="{FED3054F-0676-B4DB-AFD8-E92BAAEDFF22}"/>
-              </a:ext>
-            </a:extLst>
-          </p:cNvPr>
-          <p:cNvSpPr txBox="1"/>
-          <p:nvPr/>
-        </p:nvSpPr>
-        <p:spPr>
-          <a:xfrm>
-            <a:off x="911439" y="3906178"/>
-            <a:ext cx="5149049" cy="1200329"/>
-          </a:xfrm>
-          <a:prstGeom prst="rect">
-            <a:avLst/>
-          </a:prstGeom>
-          <a:noFill/>
-        </p:spPr>
-        <p:txBody>
-          <a:bodyPr wrap="square" rtlCol="0">
-            <a:spAutoFit/>
+        <p:txBody>
+          <a:bodyPr vert="horz" lIns="91440" tIns="45720" rIns="91440" bIns="45720" rtlCol="0" anchor="ctr">
+            <a:normAutofit/>
           </a:bodyPr>
-          <a:lstStyle/>
-          <a:p>
-            <a:pPr marL="285750" indent="-285750">
+          <a:lstStyle>
+            <a:lvl1pPr marL="228600" indent="-228600" algn="l" defTabSz="914400" rtl="0" eaLnBrk="1" latinLnBrk="0" hangingPunct="1">
+              <a:lnSpc>
+                <a:spcPct val="90000"/>
+              </a:lnSpc>
+              <a:spcBef>
+                <a:spcPts val="1000"/>
+              </a:spcBef>
               <a:buFont typeface="Arial" panose="020B0604020202020204" pitchFamily="34" charset="0"/>
               <a:buChar char="•"/>
+              <a:defRPr sz="2800" kern="1200">
+                <a:solidFill>
+                  <a:schemeClr val="tx1"/>
+                </a:solidFill>
+                <a:latin typeface="+mn-lt"/>
+                <a:ea typeface="+mn-ea"/>
+                <a:cs typeface="+mn-cs"/>
+              </a:defRPr>
+            </a:lvl1pPr>
+            <a:lvl2pPr marL="685800" indent="-228600" algn="l" defTabSz="914400" rtl="0" eaLnBrk="1" latinLnBrk="0" hangingPunct="1">
+              <a:lnSpc>
+                <a:spcPct val="90000"/>
+              </a:lnSpc>
+              <a:spcBef>
+                <a:spcPts val="500"/>
+              </a:spcBef>
+              <a:buFont typeface="Arial" panose="020B0604020202020204" pitchFamily="34" charset="0"/>
+              <a:buChar char="•"/>
+              <a:defRPr sz="2400" kern="1200">
+                <a:solidFill>
+                  <a:schemeClr val="tx1"/>
+                </a:solidFill>
+                <a:latin typeface="+mn-lt"/>
+                <a:ea typeface="+mn-ea"/>
+                <a:cs typeface="+mn-cs"/>
+              </a:defRPr>
+            </a:lvl2pPr>
+            <a:lvl3pPr marL="1143000" indent="-228600" algn="l" defTabSz="914400" rtl="0" eaLnBrk="1" latinLnBrk="0" hangingPunct="1">
+              <a:lnSpc>
+                <a:spcPct val="90000"/>
+              </a:lnSpc>
+              <a:spcBef>
+                <a:spcPts val="500"/>
+              </a:spcBef>
+              <a:buFont typeface="Arial" panose="020B0604020202020204" pitchFamily="34" charset="0"/>
+              <a:buChar char="•"/>
+              <a:defRPr sz="2000" kern="1200">
+                <a:solidFill>
+                  <a:schemeClr val="tx1"/>
+                </a:solidFill>
+                <a:latin typeface="+mn-lt"/>
+                <a:ea typeface="+mn-ea"/>
+                <a:cs typeface="+mn-cs"/>
+              </a:defRPr>
+            </a:lvl3pPr>
+            <a:lvl4pPr marL="1600200" indent="-228600" algn="l" defTabSz="914400" rtl="0" eaLnBrk="1" latinLnBrk="0" hangingPunct="1">
+              <a:lnSpc>
+                <a:spcPct val="90000"/>
+              </a:lnSpc>
+              <a:spcBef>
+                <a:spcPts val="500"/>
+              </a:spcBef>
+              <a:buFont typeface="Arial" panose="020B0604020202020204" pitchFamily="34" charset="0"/>
+              <a:buChar char="•"/>
+              <a:defRPr sz="1800" kern="1200">
+                <a:solidFill>
+                  <a:schemeClr val="tx1"/>
+                </a:solidFill>
+                <a:latin typeface="+mn-lt"/>
+                <a:ea typeface="+mn-ea"/>
+                <a:cs typeface="+mn-cs"/>
+              </a:defRPr>
+            </a:lvl4pPr>
+            <a:lvl5pPr marL="2057400" indent="-228600" algn="l" defTabSz="914400" rtl="0" eaLnBrk="1" latinLnBrk="0" hangingPunct="1">
+              <a:lnSpc>
+                <a:spcPct val="90000"/>
+              </a:lnSpc>
+              <a:spcBef>
+                <a:spcPts val="500"/>
+              </a:spcBef>
+              <a:buFont typeface="Arial" panose="020B0604020202020204" pitchFamily="34" charset="0"/>
+              <a:buChar char="•"/>
+              <a:defRPr sz="1800" kern="1200">
+                <a:solidFill>
+                  <a:schemeClr val="tx1"/>
+                </a:solidFill>
+                <a:latin typeface="+mn-lt"/>
+                <a:ea typeface="+mn-ea"/>
+                <a:cs typeface="+mn-cs"/>
+              </a:defRPr>
+            </a:lvl5pPr>
+            <a:lvl6pPr marL="2514600" indent="-228600" algn="l" defTabSz="914400" rtl="0" eaLnBrk="1" latinLnBrk="0" hangingPunct="1">
+              <a:lnSpc>
+                <a:spcPct val="90000"/>
+              </a:lnSpc>
+              <a:spcBef>
+                <a:spcPts val="500"/>
+              </a:spcBef>
+              <a:buFont typeface="Arial" panose="020B0604020202020204" pitchFamily="34" charset="0"/>
+              <a:buChar char="•"/>
+              <a:defRPr sz="1800" kern="1200">
+                <a:solidFill>
+                  <a:schemeClr val="tx1"/>
+                </a:solidFill>
+                <a:latin typeface="+mn-lt"/>
+                <a:ea typeface="+mn-ea"/>
+                <a:cs typeface="+mn-cs"/>
+              </a:defRPr>
+            </a:lvl6pPr>
+            <a:lvl7pPr marL="2971800" indent="-228600" algn="l" defTabSz="914400" rtl="0" eaLnBrk="1" latinLnBrk="0" hangingPunct="1">
+              <a:lnSpc>
+                <a:spcPct val="90000"/>
+              </a:lnSpc>
+              <a:spcBef>
+                <a:spcPts val="500"/>
+              </a:spcBef>
+              <a:buFont typeface="Arial" panose="020B0604020202020204" pitchFamily="34" charset="0"/>
+              <a:buChar char="•"/>
+              <a:defRPr sz="1800" kern="1200">
+                <a:solidFill>
+                  <a:schemeClr val="tx1"/>
+                </a:solidFill>
+                <a:latin typeface="+mn-lt"/>
+                <a:ea typeface="+mn-ea"/>
+                <a:cs typeface="+mn-cs"/>
+              </a:defRPr>
+            </a:lvl7pPr>
+            <a:lvl8pPr marL="3429000" indent="-228600" algn="l" defTabSz="914400" rtl="0" eaLnBrk="1" latinLnBrk="0" hangingPunct="1">
+              <a:lnSpc>
+                <a:spcPct val="90000"/>
+              </a:lnSpc>
+              <a:spcBef>
+                <a:spcPts val="500"/>
+              </a:spcBef>
+              <a:buFont typeface="Arial" panose="020B0604020202020204" pitchFamily="34" charset="0"/>
+              <a:buChar char="•"/>
+              <a:defRPr sz="1800" kern="1200">
+                <a:solidFill>
+                  <a:schemeClr val="tx1"/>
+                </a:solidFill>
+                <a:latin typeface="+mn-lt"/>
+                <a:ea typeface="+mn-ea"/>
+                <a:cs typeface="+mn-cs"/>
+              </a:defRPr>
+            </a:lvl8pPr>
+            <a:lvl9pPr marL="3886200" indent="-228600" algn="l" defTabSz="914400" rtl="0" eaLnBrk="1" latinLnBrk="0" hangingPunct="1">
+              <a:lnSpc>
+                <a:spcPct val="90000"/>
+              </a:lnSpc>
+              <a:spcBef>
+                <a:spcPts val="500"/>
+              </a:spcBef>
+              <a:buFont typeface="Arial" panose="020B0604020202020204" pitchFamily="34" charset="0"/>
+              <a:buChar char="•"/>
+              <a:defRPr sz="1800" kern="1200">
+                <a:solidFill>
+                  <a:schemeClr val="tx1"/>
+                </a:solidFill>
+                <a:latin typeface="+mn-lt"/>
+                <a:ea typeface="+mn-ea"/>
+                <a:cs typeface="+mn-cs"/>
+              </a:defRPr>
+            </a:lvl9pPr>
+          </a:lstStyle>
+          <a:p>
+            <a:pPr marL="457200" indent="-457200">
+              <a:lnSpc>
+                <a:spcPct val="100000"/>
+              </a:lnSpc>
+              <a:buFont typeface="+mj-lt"/>
+              <a:buAutoNum type="arabicPeriod" startAt="4"/>
             </a:pPr>
             <a:r>
-              <a:rPr lang="bg-BG" dirty="0">
-                <a:latin typeface="Arial" panose="020B0604020202020204" pitchFamily="34" charset="0"/>
-                <a:cs typeface="Arial" panose="020B0604020202020204" pitchFamily="34" charset="0"/>
-              </a:rPr>
-              <a:t>При </a:t>
-            </a:r>
-            <a:r>
-              <a:rPr lang="en-US" dirty="0">
-                <a:latin typeface="Arial" panose="020B0604020202020204" pitchFamily="34" charset="0"/>
-                <a:cs typeface="Arial" panose="020B0604020202020204" pitchFamily="34" charset="0"/>
-              </a:rPr>
-              <a:t>BASH</a:t>
-            </a:r>
-            <a:r>
-              <a:rPr lang="bg-BG" dirty="0">
-                <a:latin typeface="Arial" panose="020B0604020202020204" pitchFamily="34" charset="0"/>
-                <a:cs typeface="Arial" panose="020B0604020202020204" pitchFamily="34" charset="0"/>
-              </a:rPr>
-              <a:t> програмирането се използват и ключовите думи </a:t>
-            </a:r>
-            <a:r>
-              <a:rPr lang="en-US" b="1" dirty="0">
+              <a:rPr lang="bg-BG" sz="2200" dirty="0">
+                <a:latin typeface="Arial" panose="020B0604020202020204" pitchFamily="34" charset="0"/>
+                <a:cs typeface="Arial" panose="020B0604020202020204" pitchFamily="34" charset="0"/>
+              </a:rPr>
+              <a:t>Четене на </a:t>
+            </a:r>
+            <a:r>
+              <a:rPr lang="en-US" sz="2200" dirty="0">
+                <a:latin typeface="Arial" panose="020B0604020202020204" pitchFamily="34" charset="0"/>
+                <a:cs typeface="Arial" panose="020B0604020202020204" pitchFamily="34" charset="0"/>
+              </a:rPr>
+              <a:t>input </a:t>
+            </a:r>
+            <a:r>
+              <a:rPr lang="bg-BG" sz="2200" dirty="0">
+                <a:latin typeface="Arial" panose="020B0604020202020204" pitchFamily="34" charset="0"/>
+                <a:cs typeface="Arial" panose="020B0604020202020204" pitchFamily="34" charset="0"/>
+              </a:rPr>
+              <a:t>в терминала и записване като променлива:</a:t>
+            </a:r>
+          </a:p>
+          <a:p>
+            <a:pPr lvl="1">
+              <a:lnSpc>
+                <a:spcPct val="100000"/>
+              </a:lnSpc>
+            </a:pPr>
+            <a:r>
+              <a:rPr lang="bg-BG" sz="1800" dirty="0">
+                <a:latin typeface="Arial" panose="020B0604020202020204" pitchFamily="34" charset="0"/>
+                <a:cs typeface="Arial" panose="020B0604020202020204" pitchFamily="34" charset="0"/>
+              </a:rPr>
+              <a:t>Използва се командата </a:t>
+            </a:r>
+            <a:r>
+              <a:rPr lang="en-US" sz="1800" b="1" dirty="0">
                 <a:latin typeface="poppins" panose="00000500000000000000" pitchFamily="2" charset="0"/>
                 <a:cs typeface="poppins" panose="00000500000000000000" pitchFamily="2" charset="0"/>
               </a:rPr>
-              <a:t>then</a:t>
-            </a:r>
-            <a:r>
-              <a:rPr lang="bg-BG" dirty="0">
-                <a:latin typeface="Arial" panose="020B0604020202020204" pitchFamily="34" charset="0"/>
-                <a:cs typeface="Arial" panose="020B0604020202020204" pitchFamily="34" charset="0"/>
-              </a:rPr>
-              <a:t> и</a:t>
-            </a:r>
-            <a:r>
-              <a:rPr lang="en-US" dirty="0">
-                <a:latin typeface="Arial" panose="020B0604020202020204" pitchFamily="34" charset="0"/>
-                <a:cs typeface="Arial" panose="020B0604020202020204" pitchFamily="34" charset="0"/>
-              </a:rPr>
-              <a:t> </a:t>
-            </a:r>
-            <a:r>
-              <a:rPr lang="en-US" b="1" dirty="0">
-                <a:latin typeface="poppins" panose="00000500000000000000" pitchFamily="2" charset="0"/>
-                <a:cs typeface="poppins" panose="00000500000000000000" pitchFamily="2" charset="0"/>
-              </a:rPr>
-              <a:t>fi</a:t>
-            </a:r>
-            <a:r>
-              <a:rPr lang="bg-BG" b="1" dirty="0">
-                <a:latin typeface="poppins" panose="00000500000000000000" pitchFamily="2" charset="0"/>
-                <a:cs typeface="poppins" panose="00000500000000000000" pitchFamily="2" charset="0"/>
-              </a:rPr>
-              <a:t> </a:t>
-            </a:r>
-            <a:endParaRPr lang="en-US" b="1" dirty="0">
-              <a:latin typeface="poppins" panose="00000500000000000000" pitchFamily="2" charset="0"/>
-              <a:cs typeface="poppins" panose="00000500000000000000" pitchFamily="2" charset="0"/>
-            </a:endParaRPr>
-          </a:p>
-          <a:p>
-            <a:pPr marL="285750" indent="-285750">
-              <a:buFont typeface="Arial" panose="020B0604020202020204" pitchFamily="34" charset="0"/>
-              <a:buChar char="•"/>
-            </a:pPr>
-            <a:r>
-              <a:rPr lang="bg-BG" dirty="0">
-                <a:latin typeface="Arial" panose="020B0604020202020204" pitchFamily="34" charset="0"/>
-                <a:cs typeface="Arial" panose="020B0604020202020204" pitchFamily="34" charset="0"/>
-              </a:rPr>
-              <a:t>При </a:t>
-            </a:r>
-            <a:r>
-              <a:rPr lang="en-US" dirty="0">
-                <a:latin typeface="Arial" panose="020B0604020202020204" pitchFamily="34" charset="0"/>
-                <a:cs typeface="Arial" panose="020B0604020202020204" pitchFamily="34" charset="0"/>
-              </a:rPr>
-              <a:t>BASH</a:t>
-            </a:r>
-            <a:r>
-              <a:rPr lang="bg-BG" dirty="0">
-                <a:latin typeface="Arial" panose="020B0604020202020204" pitchFamily="34" charset="0"/>
-                <a:cs typeface="Arial" panose="020B0604020202020204" pitchFamily="34" charset="0"/>
-              </a:rPr>
-              <a:t> програмирането </a:t>
-            </a:r>
-            <a:r>
-              <a:rPr lang="en-US" dirty="0">
-                <a:latin typeface="Arial" panose="020B0604020202020204" pitchFamily="34" charset="0"/>
-                <a:cs typeface="Arial" panose="020B0604020202020204" pitchFamily="34" charset="0"/>
-              </a:rPr>
-              <a:t>else if </a:t>
-            </a:r>
-            <a:r>
-              <a:rPr lang="bg-BG" dirty="0">
-                <a:latin typeface="Arial" panose="020B0604020202020204" pitchFamily="34" charset="0"/>
-                <a:cs typeface="Arial" panose="020B0604020202020204" pitchFamily="34" charset="0"/>
-              </a:rPr>
-              <a:t>се записва с </a:t>
-            </a:r>
-            <a:r>
-              <a:rPr lang="en-US" b="1" dirty="0" err="1">
-                <a:latin typeface="poppins" panose="00000500000000000000" pitchFamily="2" charset="0"/>
-                <a:cs typeface="poppins" panose="00000500000000000000" pitchFamily="2" charset="0"/>
-              </a:rPr>
-              <a:t>elif</a:t>
-            </a:r>
-            <a:endParaRPr lang="en-US" b="1" dirty="0">
-              <a:latin typeface="poppins" panose="00000500000000000000" pitchFamily="2" charset="0"/>
-              <a:cs typeface="poppins" panose="00000500000000000000" pitchFamily="2" charset="0"/>
-            </a:endParaRPr>
-          </a:p>
-        </p:txBody>
-      </p:sp>
-      <p:sp>
-        <p:nvSpPr>
-          <p:cNvPr id="20" name="Текстово поле 19">
-            <a:extLst>
-              <a:ext uri="{FF2B5EF4-FFF2-40B4-BE49-F238E27FC236}">
-                <a16:creationId xmlns:a16="http://schemas.microsoft.com/office/drawing/2014/main" id="{BD54FCC0-0A53-81F2-DC98-412BEEF09A7C}"/>
-              </a:ext>
-            </a:extLst>
-          </p:cNvPr>
-          <p:cNvSpPr txBox="1"/>
-          <p:nvPr/>
-        </p:nvSpPr>
-        <p:spPr>
-          <a:xfrm>
-            <a:off x="5328673" y="6151317"/>
-            <a:ext cx="767326" cy="369332"/>
-          </a:xfrm>
-          <a:prstGeom prst="rect">
-            <a:avLst/>
-          </a:prstGeom>
-          <a:noFill/>
-        </p:spPr>
-        <p:txBody>
-          <a:bodyPr wrap="none" rtlCol="0">
-            <a:spAutoFit/>
-          </a:bodyPr>
-          <a:lstStyle/>
-          <a:p>
-            <a:r>
-              <a:rPr lang="bg-BG" dirty="0"/>
-              <a:t>Фиг. 1</a:t>
-            </a:r>
-            <a:endParaRPr lang="en-US" dirty="0"/>
+              <a:t>read</a:t>
+            </a:r>
           </a:p>
         </p:txBody>
       </p:sp>
     </p:spTree>
     <p:extLst>
       <p:ext uri="{BB962C8B-B14F-4D97-AF65-F5344CB8AC3E}">
-        <p14:creationId xmlns:p14="http://schemas.microsoft.com/office/powerpoint/2010/main" val="326698737"/>
+        <p14:creationId xmlns:p14="http://schemas.microsoft.com/office/powerpoint/2010/main" val="3895090374"/>
       </p:ext>
     </p:extLst>
   </p:cSld>

</xml_diff>